<commit_message>
updating layout of data capture slide
</commit_message>
<xml_diff>
--- a/Documentation/Presentations/Supervisor Meetings/update_130123.pptx
+++ b/Documentation/Presentations/Supervisor Meetings/update_130123.pptx
@@ -859,7 +859,7 @@
           <a:p>
             <a:fld id="{29C34BBC-E187-4F71-AC09-E74AF8941967}" type="datetimeFigureOut">
               <a:rPr lang="en-GB" smtClean="0"/>
-              <a:t>12/01/2023</a:t>
+              <a:t>13/01/2023</a:t>
             </a:fld>
             <a:endParaRPr lang="en-GB"/>
           </a:p>
@@ -1059,7 +1059,7 @@
           <a:p>
             <a:fld id="{29C34BBC-E187-4F71-AC09-E74AF8941967}" type="datetimeFigureOut">
               <a:rPr lang="en-GB" smtClean="0"/>
-              <a:t>12/01/2023</a:t>
+              <a:t>13/01/2023</a:t>
             </a:fld>
             <a:endParaRPr lang="en-GB"/>
           </a:p>
@@ -1269,7 +1269,7 @@
           <a:p>
             <a:fld id="{29C34BBC-E187-4F71-AC09-E74AF8941967}" type="datetimeFigureOut">
               <a:rPr lang="en-GB" smtClean="0"/>
-              <a:t>12/01/2023</a:t>
+              <a:t>13/01/2023</a:t>
             </a:fld>
             <a:endParaRPr lang="en-GB"/>
           </a:p>
@@ -1469,7 +1469,7 @@
           <a:p>
             <a:fld id="{29C34BBC-E187-4F71-AC09-E74AF8941967}" type="datetimeFigureOut">
               <a:rPr lang="en-GB" smtClean="0"/>
-              <a:t>12/01/2023</a:t>
+              <a:t>13/01/2023</a:t>
             </a:fld>
             <a:endParaRPr lang="en-GB"/>
           </a:p>
@@ -1745,7 +1745,7 @@
           <a:p>
             <a:fld id="{29C34BBC-E187-4F71-AC09-E74AF8941967}" type="datetimeFigureOut">
               <a:rPr lang="en-GB" smtClean="0"/>
-              <a:t>12/01/2023</a:t>
+              <a:t>13/01/2023</a:t>
             </a:fld>
             <a:endParaRPr lang="en-GB"/>
           </a:p>
@@ -2013,7 +2013,7 @@
           <a:p>
             <a:fld id="{29C34BBC-E187-4F71-AC09-E74AF8941967}" type="datetimeFigureOut">
               <a:rPr lang="en-GB" smtClean="0"/>
-              <a:t>12/01/2023</a:t>
+              <a:t>13/01/2023</a:t>
             </a:fld>
             <a:endParaRPr lang="en-GB"/>
           </a:p>
@@ -2428,7 +2428,7 @@
           <a:p>
             <a:fld id="{29C34BBC-E187-4F71-AC09-E74AF8941967}" type="datetimeFigureOut">
               <a:rPr lang="en-GB" smtClean="0"/>
-              <a:t>12/01/2023</a:t>
+              <a:t>13/01/2023</a:t>
             </a:fld>
             <a:endParaRPr lang="en-GB"/>
           </a:p>
@@ -2570,7 +2570,7 @@
           <a:p>
             <a:fld id="{29C34BBC-E187-4F71-AC09-E74AF8941967}" type="datetimeFigureOut">
               <a:rPr lang="en-GB" smtClean="0"/>
-              <a:t>12/01/2023</a:t>
+              <a:t>13/01/2023</a:t>
             </a:fld>
             <a:endParaRPr lang="en-GB"/>
           </a:p>
@@ -2683,7 +2683,7 @@
           <a:p>
             <a:fld id="{29C34BBC-E187-4F71-AC09-E74AF8941967}" type="datetimeFigureOut">
               <a:rPr lang="en-GB" smtClean="0"/>
-              <a:t>12/01/2023</a:t>
+              <a:t>13/01/2023</a:t>
             </a:fld>
             <a:endParaRPr lang="en-GB"/>
           </a:p>
@@ -2996,7 +2996,7 @@
           <a:p>
             <a:fld id="{29C34BBC-E187-4F71-AC09-E74AF8941967}" type="datetimeFigureOut">
               <a:rPr lang="en-GB" smtClean="0"/>
-              <a:t>12/01/2023</a:t>
+              <a:t>13/01/2023</a:t>
             </a:fld>
             <a:endParaRPr lang="en-GB"/>
           </a:p>
@@ -3285,7 +3285,7 @@
           <a:p>
             <a:fld id="{29C34BBC-E187-4F71-AC09-E74AF8941967}" type="datetimeFigureOut">
               <a:rPr lang="en-GB" smtClean="0"/>
-              <a:t>12/01/2023</a:t>
+              <a:t>13/01/2023</a:t>
             </a:fld>
             <a:endParaRPr lang="en-GB"/>
           </a:p>
@@ -3528,7 +3528,7 @@
           <a:p>
             <a:fld id="{29C34BBC-E187-4F71-AC09-E74AF8941967}" type="datetimeFigureOut">
               <a:rPr lang="en-GB" smtClean="0"/>
-              <a:t>12/01/2023</a:t>
+              <a:t>13/01/2023</a:t>
             </a:fld>
             <a:endParaRPr lang="en-GB"/>
           </a:p>
@@ -6453,12 +6453,12 @@
           <a:chExt cx="0" cy="0"/>
         </a:xfrm>
       </p:grpSpPr>
-      <p:sp useBgFill="1">
-        <p:nvSpPr>
-          <p:cNvPr id="46" name="Rectangle 31">
-            <a:extLst>
-              <a:ext uri="{FF2B5EF4-FFF2-40B4-BE49-F238E27FC236}">
-                <a16:creationId xmlns:a16="http://schemas.microsoft.com/office/drawing/2014/main" id="{B6FACB3C-9069-4791-BC5C-0DB7CD19B853}"/>
+      <p:sp>
+        <p:nvSpPr>
+          <p:cNvPr id="53" name="Rectangle 52">
+            <a:extLst>
+              <a:ext uri="{FF2B5EF4-FFF2-40B4-BE49-F238E27FC236}">
+                <a16:creationId xmlns:a16="http://schemas.microsoft.com/office/drawing/2014/main" id="{87A57295-2710-4920-B99A-4D1FA03A62BD}"/>
               </a:ext>
               <a:ext uri="{C183D7F6-B498-43B3-948B-1728B52AA6E4}">
                 <adec:decorative xmlns:adec="http://schemas.microsoft.com/office/drawing/2017/decorative" val="1"/>
@@ -6479,7 +6479,73 @@
         <p:spPr>
           <a:xfrm>
             <a:off x="0" y="0"/>
-            <a:ext cx="12192000" cy="6858000"/>
+            <a:ext cx="12188952" cy="6858000"/>
+          </a:xfrm>
+          <a:prstGeom prst="rect">
+            <a:avLst/>
+          </a:prstGeom>
+          <a:solidFill>
+            <a:schemeClr val="tx1">
+              <a:lumMod val="75000"/>
+              <a:lumOff val="25000"/>
+            </a:schemeClr>
+          </a:solidFill>
+          <a:ln>
+            <a:noFill/>
+          </a:ln>
+        </p:spPr>
+        <p:style>
+          <a:lnRef idx="2">
+            <a:schemeClr val="accent1">
+              <a:shade val="50000"/>
+            </a:schemeClr>
+          </a:lnRef>
+          <a:fillRef idx="1">
+            <a:schemeClr val="accent1"/>
+          </a:fillRef>
+          <a:effectRef idx="0">
+            <a:schemeClr val="accent1"/>
+          </a:effectRef>
+          <a:fontRef idx="minor">
+            <a:schemeClr val="lt1"/>
+          </a:fontRef>
+        </p:style>
+        <p:txBody>
+          <a:bodyPr rtlCol="0" anchor="ctr"/>
+          <a:lstStyle/>
+          <a:p>
+            <a:pPr algn="ctr"/>
+            <a:endParaRPr lang="en-US"/>
+          </a:p>
+        </p:txBody>
+      </p:sp>
+      <p:sp useBgFill="1">
+        <p:nvSpPr>
+          <p:cNvPr id="55" name="Rectangle 54">
+            <a:extLst>
+              <a:ext uri="{FF2B5EF4-FFF2-40B4-BE49-F238E27FC236}">
+                <a16:creationId xmlns:a16="http://schemas.microsoft.com/office/drawing/2014/main" id="{78067929-4D33-4306-9E2F-67C49CDDB5DE}"/>
+              </a:ext>
+              <a:ext uri="{C183D7F6-B498-43B3-948B-1728B52AA6E4}">
+                <adec:decorative xmlns:adec="http://schemas.microsoft.com/office/drawing/2017/decorative" val="1"/>
+              </a:ext>
+            </a:extLst>
+          </p:cNvPr>
+          <p:cNvSpPr>
+            <a:spLocks noGrp="1" noRot="1" noChangeAspect="1" noMove="1" noResize="1" noEditPoints="1" noAdjustHandles="1" noChangeArrowheads="1" noChangeShapeType="1" noTextEdit="1"/>
+          </p:cNvSpPr>
+          <p:nvPr>
+            <p:extLst>
+              <p:ext uri="{386F3935-93C4-4BCD-93E2-E3B085C9AB24}">
+                <p16:designElem xmlns:p16="http://schemas.microsoft.com/office/powerpoint/2015/main" val="1"/>
+              </p:ext>
+            </p:extLst>
+          </p:nvPr>
+        </p:nvSpPr>
+        <p:spPr>
+          <a:xfrm>
+            <a:off x="533400" y="465745"/>
+            <a:ext cx="11125200" cy="5639435"/>
           </a:xfrm>
           <a:prstGeom prst="rect">
             <a:avLst/>
@@ -6515,19 +6581,55 @@
       </p:sp>
       <p:sp>
         <p:nvSpPr>
-          <p:cNvPr id="47" name="Rectangle 33">
-            <a:extLst>
-              <a:ext uri="{FF2B5EF4-FFF2-40B4-BE49-F238E27FC236}">
-                <a16:creationId xmlns:a16="http://schemas.microsoft.com/office/drawing/2014/main" id="{71F2038E-D777-4B76-81DD-DD13EE91B9DD}"/>
+          <p:cNvPr id="5" name="Title 4">
+            <a:extLst>
+              <a:ext uri="{FF2B5EF4-FFF2-40B4-BE49-F238E27FC236}">
+                <a16:creationId xmlns:a16="http://schemas.microsoft.com/office/drawing/2014/main" id="{ABD5685E-FCF3-4212-0470-7D68B5219F40}"/>
+              </a:ext>
+            </a:extLst>
+          </p:cNvPr>
+          <p:cNvSpPr>
+            <a:spLocks noGrp="1"/>
+          </p:cNvSpPr>
+          <p:nvPr>
+            <p:ph type="title"/>
+          </p:nvPr>
+        </p:nvSpPr>
+        <p:spPr>
+          <a:xfrm>
+            <a:off x="838200" y="894027"/>
+            <a:ext cx="3494362" cy="4782873"/>
+          </a:xfrm>
+        </p:spPr>
+        <p:txBody>
+          <a:bodyPr>
+            <a:normAutofit/>
+          </a:bodyPr>
+          <a:lstStyle/>
+          <a:p>
+            <a:pPr algn="r"/>
+            <a:r>
+              <a:rPr lang="en-GB"/>
+              <a:t>Data Capture	</a:t>
+            </a:r>
+          </a:p>
+        </p:txBody>
+      </p:sp>
+      <p:cxnSp>
+        <p:nvCxnSpPr>
+          <p:cNvPr id="57" name="Straight Connector 56">
+            <a:extLst>
+              <a:ext uri="{FF2B5EF4-FFF2-40B4-BE49-F238E27FC236}">
+                <a16:creationId xmlns:a16="http://schemas.microsoft.com/office/drawing/2014/main" id="{2D72A2C9-F3CA-4216-8BAD-FA4C970C3C4E}"/>
               </a:ext>
               <a:ext uri="{C183D7F6-B498-43B3-948B-1728B52AA6E4}">
                 <adec:decorative xmlns:adec="http://schemas.microsoft.com/office/drawing/2017/decorative" val="1"/>
               </a:ext>
             </a:extLst>
           </p:cNvPr>
-          <p:cNvSpPr>
-            <a:spLocks noGrp="1" noRot="1" noChangeAspect="1" noMove="1" noResize="1" noEditPoints="1" noAdjustHandles="1" noChangeArrowheads="1" noChangeShapeType="1" noTextEdit="1"/>
-          </p:cNvSpPr>
+          <p:cNvCxnSpPr>
+            <a:cxnSpLocks noGrp="1" noRot="1" noChangeAspect="1" noMove="1" noResize="1" noEditPoints="1" noAdjustHandles="1" noChangeArrowheads="1" noChangeShapeType="1"/>
+          </p:cNvCxnSpPr>
           <p:nvPr>
             <p:extLst>
               <p:ext uri="{386F3935-93C4-4BCD-93E2-E3B085C9AB24}">
@@ -6535,53 +6637,44 @@
               </p:ext>
             </p:extLst>
           </p:nvPr>
-        </p:nvSpPr>
+        </p:nvCxnSpPr>
         <p:spPr>
           <a:xfrm>
-            <a:off x="305" y="0"/>
-            <a:ext cx="12191695" cy="6858000"/>
+            <a:off x="4654296" y="2057400"/>
+            <a:ext cx="0" cy="2743200"/>
           </a:xfrm>
-          <a:prstGeom prst="rect">
+          <a:prstGeom prst="line">
             <a:avLst/>
           </a:prstGeom>
-          <a:solidFill>
-            <a:schemeClr val="bg1"/>
-          </a:solidFill>
-          <a:ln>
-            <a:noFill/>
+          <a:ln w="19050">
+            <a:solidFill>
+              <a:schemeClr val="tx1">
+                <a:alpha val="80000"/>
+              </a:schemeClr>
+            </a:solidFill>
           </a:ln>
         </p:spPr>
         <p:style>
-          <a:lnRef idx="2">
-            <a:schemeClr val="accent1">
-              <a:shade val="50000"/>
-            </a:schemeClr>
+          <a:lnRef idx="1">
+            <a:schemeClr val="accent1"/>
           </a:lnRef>
-          <a:fillRef idx="1">
+          <a:fillRef idx="0">
             <a:schemeClr val="accent1"/>
           </a:fillRef>
           <a:effectRef idx="0">
             <a:schemeClr val="accent1"/>
           </a:effectRef>
           <a:fontRef idx="minor">
-            <a:schemeClr val="lt1"/>
+            <a:schemeClr val="tx1"/>
           </a:fontRef>
         </p:style>
-        <p:txBody>
-          <a:bodyPr rtlCol="0" anchor="ctr"/>
-          <a:lstStyle/>
-          <a:p>
-            <a:pPr algn="ctr"/>
-            <a:endParaRPr lang="en-US"/>
-          </a:p>
-        </p:txBody>
-      </p:sp>
+      </p:cxnSp>
       <p:sp>
         <p:nvSpPr>
-          <p:cNvPr id="5" name="Title 4">
-            <a:extLst>
-              <a:ext uri="{FF2B5EF4-FFF2-40B4-BE49-F238E27FC236}">
-                <a16:creationId xmlns:a16="http://schemas.microsoft.com/office/drawing/2014/main" id="{ABD5685E-FCF3-4212-0470-7D68B5219F40}"/>
+          <p:cNvPr id="6" name="Content Placeholder 5">
+            <a:extLst>
+              <a:ext uri="{FF2B5EF4-FFF2-40B4-BE49-F238E27FC236}">
+                <a16:creationId xmlns:a16="http://schemas.microsoft.com/office/drawing/2014/main" id="{A18D25AE-363A-1033-3D79-96FE5FA4D366}"/>
               </a:ext>
             </a:extLst>
           </p:cNvPr>
@@ -6589,2655 +6682,84 @@
             <a:spLocks noGrp="1"/>
           </p:cNvSpPr>
           <p:nvPr>
-            <p:ph type="title"/>
+            <p:ph idx="1"/>
           </p:nvPr>
         </p:nvSpPr>
         <p:spPr>
           <a:xfrm>
-            <a:off x="804672" y="802955"/>
-            <a:ext cx="4766330" cy="1454051"/>
+            <a:off x="4976032" y="894027"/>
+            <a:ext cx="6377768" cy="4782873"/>
           </a:xfrm>
         </p:spPr>
         <p:txBody>
-          <a:bodyPr>
+          <a:bodyPr anchor="ctr">
             <a:normAutofit/>
           </a:bodyPr>
           <a:lstStyle/>
           <a:p>
             <a:r>
-              <a:rPr lang="en-GB" sz="3600" dirty="0">
-                <a:solidFill>
-                  <a:schemeClr val="tx2"/>
-                </a:solidFill>
-              </a:rPr>
-              <a:t>Data Capture	</a:t>
-            </a:r>
-          </a:p>
-        </p:txBody>
-      </p:sp>
-      <p:sp>
-        <p:nvSpPr>
-          <p:cNvPr id="6" name="Content Placeholder 5">
-            <a:extLst>
-              <a:ext uri="{FF2B5EF4-FFF2-40B4-BE49-F238E27FC236}">
-                <a16:creationId xmlns:a16="http://schemas.microsoft.com/office/drawing/2014/main" id="{A18D25AE-363A-1033-3D79-96FE5FA4D366}"/>
-              </a:ext>
-            </a:extLst>
-          </p:cNvPr>
-          <p:cNvSpPr>
-            <a:spLocks noGrp="1"/>
-          </p:cNvSpPr>
-          <p:nvPr>
-            <p:ph idx="1"/>
-          </p:nvPr>
-        </p:nvSpPr>
-        <p:spPr>
-          <a:xfrm>
-            <a:off x="545880" y="2087593"/>
-            <a:ext cx="5816328" cy="3704819"/>
-          </a:xfrm>
-        </p:spPr>
-        <p:txBody>
-          <a:bodyPr anchor="t">
-            <a:normAutofit/>
-          </a:bodyPr>
-          <a:lstStyle/>
-          <a:p>
-            <a:r>
-              <a:rPr lang="en-GB" sz="1600" dirty="0"/>
+              <a:rPr lang="en-GB" sz="1900"/>
               <a:t>Data has been gathered from the following areas:</a:t>
             </a:r>
           </a:p>
           <a:p>
             <a:pPr lvl="1"/>
             <a:r>
-              <a:rPr lang="en-GB" sz="1600" dirty="0"/>
+              <a:rPr lang="en-GB" sz="1900"/>
               <a:t>A hallway with a closed door to the left of the obstacle, and an open doorway behind the obstacle and wall a few metres behind the obstacle (referred to as Area A)</a:t>
             </a:r>
           </a:p>
           <a:p>
             <a:pPr lvl="1"/>
             <a:r>
-              <a:rPr lang="en-GB" sz="1600" dirty="0"/>
+              <a:rPr lang="en-GB" sz="1900"/>
               <a:t>Same hallway as above, but away from any doors, with a wall and radiator a few metres behind the obstacle (referred to as Area B)</a:t>
             </a:r>
           </a:p>
           <a:p>
             <a:r>
-              <a:rPr lang="en-GB" sz="1600" dirty="0"/>
+              <a:rPr lang="en-GB" sz="1900"/>
               <a:t>Information gathered:</a:t>
             </a:r>
           </a:p>
           <a:p>
             <a:pPr lvl="1"/>
             <a:r>
-              <a:rPr lang="en-GB" sz="1600" dirty="0"/>
+              <a:rPr lang="en-GB" sz="1900"/>
               <a:t>Approx. 100,000 samples per channel</a:t>
             </a:r>
           </a:p>
           <a:p>
             <a:pPr lvl="1"/>
             <a:r>
-              <a:rPr lang="en-GB" sz="1600" dirty="0"/>
+              <a:rPr lang="en-GB" sz="1900"/>
               <a:t>Timestamp for each sample</a:t>
             </a:r>
           </a:p>
           <a:p>
             <a:pPr lvl="1"/>
             <a:r>
-              <a:rPr lang="en-GB" sz="1600" dirty="0"/>
+              <a:rPr lang="en-GB" sz="1900"/>
               <a:t>References for the start and end of channel data capture (in place to allow index refencing when post processing the data into final dataset)</a:t>
             </a:r>
           </a:p>
           <a:p>
             <a:pPr lvl="1"/>
             <a:r>
-              <a:rPr lang="en-GB" sz="1600" dirty="0"/>
+              <a:rPr lang="en-GB" sz="1900"/>
               <a:t>Total time for data capture (per channel) in milliseconds</a:t>
             </a:r>
           </a:p>
           <a:p>
             <a:pPr lvl="1"/>
-            <a:endParaRPr lang="en-GB" sz="1400" dirty="0">
-              <a:solidFill>
-                <a:schemeClr val="tx2"/>
-              </a:solidFill>
-            </a:endParaRPr>
+            <a:endParaRPr lang="en-GB" sz="1900"/>
           </a:p>
           <a:p>
             <a:pPr lvl="1"/>
-            <a:endParaRPr lang="en-GB" sz="1400" dirty="0">
-              <a:solidFill>
-                <a:schemeClr val="tx2"/>
-              </a:solidFill>
-            </a:endParaRPr>
-          </a:p>
-        </p:txBody>
-      </p:sp>
-      <p:grpSp>
-        <p:nvGrpSpPr>
-          <p:cNvPr id="48" name="Group 35">
-            <a:extLst>
-              <a:ext uri="{FF2B5EF4-FFF2-40B4-BE49-F238E27FC236}">
-                <a16:creationId xmlns:a16="http://schemas.microsoft.com/office/drawing/2014/main" id="{DD354807-230F-4402-B1B9-F733A8F1F190}"/>
-              </a:ext>
-              <a:ext uri="{C183D7F6-B498-43B3-948B-1728B52AA6E4}">
-                <adec:decorative xmlns:adec="http://schemas.microsoft.com/office/drawing/2017/decorative" val="1"/>
-              </a:ext>
-            </a:extLst>
-          </p:cNvPr>
-          <p:cNvGrpSpPr>
-            <a:grpSpLocks noGrp="1" noUngrp="1" noRot="1" noChangeAspect="1" noMove="1" noResize="1"/>
-          </p:cNvGrpSpPr>
-          <p:nvPr>
-            <p:extLst>
-              <p:ext uri="{386F3935-93C4-4BCD-93E2-E3B085C9AB24}">
-                <p16:designElem xmlns:p16="http://schemas.microsoft.com/office/powerpoint/2015/main" val="1"/>
-              </p:ext>
-            </p:extLst>
-          </p:nvPr>
-        </p:nvGrpSpPr>
-        <p:grpSpPr>
-          <a:xfrm>
-            <a:off x="5818240" y="-16714"/>
-            <a:ext cx="6373761" cy="6874714"/>
-            <a:chOff x="5818240" y="-1"/>
-            <a:chExt cx="6373761" cy="6874714"/>
-          </a:xfrm>
-        </p:grpSpPr>
-        <p:sp>
-          <p:nvSpPr>
-            <p:cNvPr id="37" name="Freeform: Shape 36">
-              <a:extLst>
-                <a:ext uri="{FF2B5EF4-FFF2-40B4-BE49-F238E27FC236}">
-                  <a16:creationId xmlns:a16="http://schemas.microsoft.com/office/drawing/2014/main" id="{BF5A6F4A-CE87-4D5C-9382-8167967CE813}"/>
-                </a:ext>
-                <a:ext uri="{C183D7F6-B498-43B3-948B-1728B52AA6E4}">
-                  <adec:decorative xmlns:adec="http://schemas.microsoft.com/office/drawing/2017/decorative" val="1"/>
-                </a:ext>
-              </a:extLst>
-            </p:cNvPr>
-            <p:cNvSpPr/>
-            <p:nvPr>
-              <p:extLst>
-                <p:ext uri="{386F3935-93C4-4BCD-93E2-E3B085C9AB24}">
-                  <p16:designElem xmlns:p16="http://schemas.microsoft.com/office/powerpoint/2015/main" val="1"/>
-                </p:ext>
-              </p:extLst>
-            </p:nvPr>
-          </p:nvSpPr>
-          <p:spPr>
-            <a:xfrm>
-              <a:off x="5818240" y="-1"/>
-              <a:ext cx="6373761" cy="6874714"/>
-            </a:xfrm>
-            <a:custGeom>
-              <a:avLst/>
-              <a:gdLst>
-                <a:gd name="connsiteX0" fmla="*/ 6373761 w 6373761"/>
-                <a:gd name="connsiteY0" fmla="*/ 5771297 h 6874714"/>
-                <a:gd name="connsiteX1" fmla="*/ 6373761 w 6373761"/>
-                <a:gd name="connsiteY1" fmla="*/ 6247960 h 6874714"/>
-                <a:gd name="connsiteX2" fmla="*/ 6235932 w 6373761"/>
-                <a:gd name="connsiteY2" fmla="*/ 6361930 h 6874714"/>
-                <a:gd name="connsiteX3" fmla="*/ 5960375 w 6373761"/>
-                <a:gd name="connsiteY3" fmla="*/ 6587489 h 6874714"/>
-                <a:gd name="connsiteX4" fmla="*/ 5822907 w 6373761"/>
-                <a:gd name="connsiteY4" fmla="*/ 6701871 h 6874714"/>
-                <a:gd name="connsiteX5" fmla="*/ 5681115 w 6373761"/>
-                <a:gd name="connsiteY5" fmla="*/ 6816896 h 6874714"/>
-                <a:gd name="connsiteX6" fmla="*/ 5604096 w 6373761"/>
-                <a:gd name="connsiteY6" fmla="*/ 6874714 h 6874714"/>
-                <a:gd name="connsiteX7" fmla="*/ 4878485 w 6373761"/>
-                <a:gd name="connsiteY7" fmla="*/ 6874714 h 6874714"/>
-                <a:gd name="connsiteX8" fmla="*/ 5006014 w 6373761"/>
-                <a:gd name="connsiteY8" fmla="*/ 6800200 h 6874714"/>
-                <a:gd name="connsiteX9" fmla="*/ 5149855 w 6373761"/>
-                <a:gd name="connsiteY9" fmla="*/ 6707667 h 6874714"/>
-                <a:gd name="connsiteX10" fmla="*/ 5431866 w 6373761"/>
-                <a:gd name="connsiteY10" fmla="*/ 6506210 h 6874714"/>
-                <a:gd name="connsiteX11" fmla="*/ 5571036 w 6373761"/>
-                <a:gd name="connsiteY11" fmla="*/ 6399557 h 6874714"/>
-                <a:gd name="connsiteX12" fmla="*/ 5711649 w 6373761"/>
-                <a:gd name="connsiteY12" fmla="*/ 6288912 h 6874714"/>
-                <a:gd name="connsiteX13" fmla="*/ 6276589 w 6373761"/>
-                <a:gd name="connsiteY13" fmla="*/ 5852379 h 6874714"/>
-                <a:gd name="connsiteX14" fmla="*/ 3975975 w 6373761"/>
-                <a:gd name="connsiteY14" fmla="*/ 263 h 6874714"/>
-                <a:gd name="connsiteX15" fmla="*/ 4350473 w 6373761"/>
-                <a:gd name="connsiteY15" fmla="*/ 24963 h 6874714"/>
-                <a:gd name="connsiteX16" fmla="*/ 5077909 w 6373761"/>
-                <a:gd name="connsiteY16" fmla="*/ 189450 h 6874714"/>
-                <a:gd name="connsiteX17" fmla="*/ 5746507 w 6373761"/>
-                <a:gd name="connsiteY17" fmla="*/ 505804 h 6874714"/>
-                <a:gd name="connsiteX18" fmla="*/ 6322456 w 6373761"/>
-                <a:gd name="connsiteY18" fmla="*/ 956633 h 6874714"/>
-                <a:gd name="connsiteX19" fmla="*/ 6373761 w 6373761"/>
-                <a:gd name="connsiteY19" fmla="*/ 1011863 h 6874714"/>
-                <a:gd name="connsiteX20" fmla="*/ 6373761 w 6373761"/>
-                <a:gd name="connsiteY20" fmla="*/ 1185075 h 6874714"/>
-                <a:gd name="connsiteX21" fmla="*/ 6359489 w 6373761"/>
-                <a:gd name="connsiteY21" fmla="*/ 1169497 h 6874714"/>
-                <a:gd name="connsiteX22" fmla="*/ 6233869 w 6373761"/>
-                <a:gd name="connsiteY22" fmla="*/ 1047442 h 6874714"/>
-                <a:gd name="connsiteX23" fmla="*/ 5961423 w 6373761"/>
-                <a:gd name="connsiteY23" fmla="*/ 827953 h 6874714"/>
-                <a:gd name="connsiteX24" fmla="*/ 5663555 w 6373761"/>
-                <a:gd name="connsiteY24" fmla="*/ 645304 h 6874714"/>
-                <a:gd name="connsiteX25" fmla="*/ 5013827 w 6373761"/>
-                <a:gd name="connsiteY25" fmla="*/ 397863 h 6874714"/>
-                <a:gd name="connsiteX26" fmla="*/ 4327409 w 6373761"/>
-                <a:gd name="connsiteY26" fmla="*/ 302545 h 6874714"/>
-                <a:gd name="connsiteX27" fmla="*/ 3639939 w 6373761"/>
-                <a:gd name="connsiteY27" fmla="*/ 338868 h 6874714"/>
-                <a:gd name="connsiteX28" fmla="*/ 3302495 w 6373761"/>
-                <a:gd name="connsiteY28" fmla="*/ 403659 h 6874714"/>
-                <a:gd name="connsiteX29" fmla="*/ 2971604 w 6373761"/>
-                <a:gd name="connsiteY29" fmla="*/ 496273 h 6874714"/>
-                <a:gd name="connsiteX30" fmla="*/ 2648706 w 6373761"/>
-                <a:gd name="connsiteY30" fmla="*/ 614389 h 6874714"/>
-                <a:gd name="connsiteX31" fmla="*/ 2335374 w 6373761"/>
-                <a:gd name="connsiteY31" fmla="*/ 757109 h 6874714"/>
-                <a:gd name="connsiteX32" fmla="*/ 1741342 w 6373761"/>
-                <a:gd name="connsiteY32" fmla="*/ 1107725 h 6874714"/>
-                <a:gd name="connsiteX33" fmla="*/ 1600861 w 6373761"/>
-                <a:gd name="connsiteY33" fmla="*/ 1208710 h 6874714"/>
-                <a:gd name="connsiteX34" fmla="*/ 1531799 w 6373761"/>
-                <a:gd name="connsiteY34" fmla="*/ 1260879 h 6874714"/>
-                <a:gd name="connsiteX35" fmla="*/ 1463655 w 6373761"/>
-                <a:gd name="connsiteY35" fmla="*/ 1314333 h 6874714"/>
-                <a:gd name="connsiteX36" fmla="*/ 1200777 w 6373761"/>
-                <a:gd name="connsiteY36" fmla="*/ 1541166 h 6874714"/>
-                <a:gd name="connsiteX37" fmla="*/ 731501 w 6373761"/>
-                <a:gd name="connsiteY37" fmla="*/ 2055754 h 6874714"/>
-                <a:gd name="connsiteX38" fmla="*/ 531393 w 6373761"/>
-                <a:gd name="connsiteY38" fmla="*/ 2342739 h 6874714"/>
-                <a:gd name="connsiteX39" fmla="*/ 361033 w 6373761"/>
-                <a:gd name="connsiteY39" fmla="*/ 2649046 h 6874714"/>
-                <a:gd name="connsiteX40" fmla="*/ 323292 w 6373761"/>
-                <a:gd name="connsiteY40" fmla="*/ 2728263 h 6874714"/>
-                <a:gd name="connsiteX41" fmla="*/ 304945 w 6373761"/>
-                <a:gd name="connsiteY41" fmla="*/ 2768193 h 6874714"/>
-                <a:gd name="connsiteX42" fmla="*/ 287516 w 6373761"/>
-                <a:gd name="connsiteY42" fmla="*/ 2808510 h 6874714"/>
-                <a:gd name="connsiteX43" fmla="*/ 254230 w 6373761"/>
-                <a:gd name="connsiteY43" fmla="*/ 2889788 h 6874714"/>
-                <a:gd name="connsiteX44" fmla="*/ 223042 w 6373761"/>
-                <a:gd name="connsiteY44" fmla="*/ 2971968 h 6874714"/>
-                <a:gd name="connsiteX45" fmla="*/ 121611 w 6373761"/>
-                <a:gd name="connsiteY45" fmla="*/ 3308544 h 6874714"/>
-                <a:gd name="connsiteX46" fmla="*/ 39314 w 6373761"/>
-                <a:gd name="connsiteY46" fmla="*/ 4005912 h 6874714"/>
-                <a:gd name="connsiteX47" fmla="*/ 73910 w 6373761"/>
-                <a:gd name="connsiteY47" fmla="*/ 4354081 h 6874714"/>
-                <a:gd name="connsiteX48" fmla="*/ 179534 w 6373761"/>
-                <a:gd name="connsiteY48" fmla="*/ 4687050 h 6874714"/>
-                <a:gd name="connsiteX49" fmla="*/ 215964 w 6373761"/>
-                <a:gd name="connsiteY49" fmla="*/ 4766654 h 6874714"/>
-                <a:gd name="connsiteX50" fmla="*/ 256457 w 6373761"/>
-                <a:gd name="connsiteY50" fmla="*/ 4844455 h 6874714"/>
-                <a:gd name="connsiteX51" fmla="*/ 346225 w 6373761"/>
-                <a:gd name="connsiteY51" fmla="*/ 4995290 h 6874714"/>
-                <a:gd name="connsiteX52" fmla="*/ 445296 w 6373761"/>
-                <a:gd name="connsiteY52" fmla="*/ 5140971 h 6874714"/>
-                <a:gd name="connsiteX53" fmla="*/ 551443 w 6373761"/>
-                <a:gd name="connsiteY53" fmla="*/ 5282531 h 6874714"/>
-                <a:gd name="connsiteX54" fmla="*/ 772387 w 6373761"/>
-                <a:gd name="connsiteY54" fmla="*/ 5562561 h 6874714"/>
-                <a:gd name="connsiteX55" fmla="*/ 882858 w 6373761"/>
-                <a:gd name="connsiteY55" fmla="*/ 5704507 h 6874714"/>
-                <a:gd name="connsiteX56" fmla="*/ 990316 w 6373761"/>
-                <a:gd name="connsiteY56" fmla="*/ 5848258 h 6874714"/>
-                <a:gd name="connsiteX57" fmla="*/ 1097774 w 6373761"/>
-                <a:gd name="connsiteY57" fmla="*/ 5987114 h 6874714"/>
-                <a:gd name="connsiteX58" fmla="*/ 1210080 w 6373761"/>
-                <a:gd name="connsiteY58" fmla="*/ 6121203 h 6874714"/>
-                <a:gd name="connsiteX59" fmla="*/ 1448192 w 6373761"/>
-                <a:gd name="connsiteY59" fmla="*/ 6374054 h 6874714"/>
-                <a:gd name="connsiteX60" fmla="*/ 1982991 w 6373761"/>
-                <a:gd name="connsiteY60" fmla="*/ 6796158 h 6874714"/>
-                <a:gd name="connsiteX61" fmla="*/ 2118475 w 6373761"/>
-                <a:gd name="connsiteY61" fmla="*/ 6874714 h 6874714"/>
-                <a:gd name="connsiteX62" fmla="*/ 1569874 w 6373761"/>
-                <a:gd name="connsiteY62" fmla="*/ 6874714 h 6874714"/>
-                <a:gd name="connsiteX63" fmla="*/ 1507802 w 6373761"/>
-                <a:gd name="connsiteY63" fmla="*/ 6817815 h 6874714"/>
-                <a:gd name="connsiteX64" fmla="*/ 1256865 w 6373761"/>
-                <a:gd name="connsiteY64" fmla="*/ 6543437 h 6874714"/>
-                <a:gd name="connsiteX65" fmla="*/ 1038410 w 6373761"/>
-                <a:gd name="connsiteY65" fmla="*/ 6248722 h 6874714"/>
-                <a:gd name="connsiteX66" fmla="*/ 845380 w 6373761"/>
-                <a:gd name="connsiteY66" fmla="*/ 5941386 h 6874714"/>
-                <a:gd name="connsiteX67" fmla="*/ 755351 w 6373761"/>
-                <a:gd name="connsiteY67" fmla="*/ 5788877 h 6874714"/>
-                <a:gd name="connsiteX68" fmla="*/ 661784 w 6373761"/>
-                <a:gd name="connsiteY68" fmla="*/ 5638944 h 6874714"/>
-                <a:gd name="connsiteX69" fmla="*/ 466525 w 6373761"/>
-                <a:gd name="connsiteY69" fmla="*/ 5340366 h 6874714"/>
-                <a:gd name="connsiteX70" fmla="*/ 370992 w 6373761"/>
-                <a:gd name="connsiteY70" fmla="*/ 5188502 h 6874714"/>
-                <a:gd name="connsiteX71" fmla="*/ 280046 w 6373761"/>
-                <a:gd name="connsiteY71" fmla="*/ 5033287 h 6874714"/>
-                <a:gd name="connsiteX72" fmla="*/ 126853 w 6373761"/>
-                <a:gd name="connsiteY72" fmla="*/ 4707660 h 6874714"/>
-                <a:gd name="connsiteX73" fmla="*/ 30272 w 6373761"/>
-                <a:gd name="connsiteY73" fmla="*/ 4362068 h 6874714"/>
-                <a:gd name="connsiteX74" fmla="*/ 0 w 6373761"/>
-                <a:gd name="connsiteY74" fmla="*/ 4005912 h 6874714"/>
-                <a:gd name="connsiteX75" fmla="*/ 270480 w 6373761"/>
-                <a:gd name="connsiteY75" fmla="*/ 2610532 h 6874714"/>
-                <a:gd name="connsiteX76" fmla="*/ 415942 w 6373761"/>
-                <a:gd name="connsiteY76" fmla="*/ 2280526 h 6874714"/>
-                <a:gd name="connsiteX77" fmla="*/ 590102 w 6373761"/>
-                <a:gd name="connsiteY77" fmla="*/ 1962626 h 6874714"/>
-                <a:gd name="connsiteX78" fmla="*/ 1020719 w 6373761"/>
-                <a:gd name="connsiteY78" fmla="*/ 1373070 h 6874714"/>
-                <a:gd name="connsiteX79" fmla="*/ 1275080 w 6373761"/>
-                <a:gd name="connsiteY79" fmla="*/ 1107081 h 6874714"/>
-                <a:gd name="connsiteX80" fmla="*/ 1342437 w 6373761"/>
-                <a:gd name="connsiteY80" fmla="*/ 1043965 h 6874714"/>
-                <a:gd name="connsiteX81" fmla="*/ 1411106 w 6373761"/>
-                <a:gd name="connsiteY81" fmla="*/ 982138 h 6874714"/>
-                <a:gd name="connsiteX82" fmla="*/ 1553029 w 6373761"/>
-                <a:gd name="connsiteY82" fmla="*/ 863376 h 6874714"/>
-                <a:gd name="connsiteX83" fmla="*/ 2173401 w 6373761"/>
-                <a:gd name="connsiteY83" fmla="*/ 454409 h 6874714"/>
-                <a:gd name="connsiteX84" fmla="*/ 3599708 w 6373761"/>
-                <a:gd name="connsiteY84" fmla="*/ 16332 h 6874714"/>
-                <a:gd name="connsiteX85" fmla="*/ 3975975 w 6373761"/>
-                <a:gd name="connsiteY85" fmla="*/ 263 h 6874714"/>
-              </a:gdLst>
-              <a:ahLst/>
-              <a:cxnLst>
-                <a:cxn ang="0">
-                  <a:pos x="connsiteX0" y="connsiteY0"/>
-                </a:cxn>
-                <a:cxn ang="0">
-                  <a:pos x="connsiteX1" y="connsiteY1"/>
-                </a:cxn>
-                <a:cxn ang="0">
-                  <a:pos x="connsiteX2" y="connsiteY2"/>
-                </a:cxn>
-                <a:cxn ang="0">
-                  <a:pos x="connsiteX3" y="connsiteY3"/>
-                </a:cxn>
-                <a:cxn ang="0">
-                  <a:pos x="connsiteX4" y="connsiteY4"/>
-                </a:cxn>
-                <a:cxn ang="0">
-                  <a:pos x="connsiteX5" y="connsiteY5"/>
-                </a:cxn>
-                <a:cxn ang="0">
-                  <a:pos x="connsiteX6" y="connsiteY6"/>
-                </a:cxn>
-                <a:cxn ang="0">
-                  <a:pos x="connsiteX7" y="connsiteY7"/>
-                </a:cxn>
-                <a:cxn ang="0">
-                  <a:pos x="connsiteX8" y="connsiteY8"/>
-                </a:cxn>
-                <a:cxn ang="0">
-                  <a:pos x="connsiteX9" y="connsiteY9"/>
-                </a:cxn>
-                <a:cxn ang="0">
-                  <a:pos x="connsiteX10" y="connsiteY10"/>
-                </a:cxn>
-                <a:cxn ang="0">
-                  <a:pos x="connsiteX11" y="connsiteY11"/>
-                </a:cxn>
-                <a:cxn ang="0">
-                  <a:pos x="connsiteX12" y="connsiteY12"/>
-                </a:cxn>
-                <a:cxn ang="0">
-                  <a:pos x="connsiteX13" y="connsiteY13"/>
-                </a:cxn>
-                <a:cxn ang="0">
-                  <a:pos x="connsiteX14" y="connsiteY14"/>
-                </a:cxn>
-                <a:cxn ang="0">
-                  <a:pos x="connsiteX15" y="connsiteY15"/>
-                </a:cxn>
-                <a:cxn ang="0">
-                  <a:pos x="connsiteX16" y="connsiteY16"/>
-                </a:cxn>
-                <a:cxn ang="0">
-                  <a:pos x="connsiteX17" y="connsiteY17"/>
-                </a:cxn>
-                <a:cxn ang="0">
-                  <a:pos x="connsiteX18" y="connsiteY18"/>
-                </a:cxn>
-                <a:cxn ang="0">
-                  <a:pos x="connsiteX19" y="connsiteY19"/>
-                </a:cxn>
-                <a:cxn ang="0">
-                  <a:pos x="connsiteX20" y="connsiteY20"/>
-                </a:cxn>
-                <a:cxn ang="0">
-                  <a:pos x="connsiteX21" y="connsiteY21"/>
-                </a:cxn>
-                <a:cxn ang="0">
-                  <a:pos x="connsiteX22" y="connsiteY22"/>
-                </a:cxn>
-                <a:cxn ang="0">
-                  <a:pos x="connsiteX23" y="connsiteY23"/>
-                </a:cxn>
-                <a:cxn ang="0">
-                  <a:pos x="connsiteX24" y="connsiteY24"/>
-                </a:cxn>
-                <a:cxn ang="0">
-                  <a:pos x="connsiteX25" y="connsiteY25"/>
-                </a:cxn>
-                <a:cxn ang="0">
-                  <a:pos x="connsiteX26" y="connsiteY26"/>
-                </a:cxn>
-                <a:cxn ang="0">
-                  <a:pos x="connsiteX27" y="connsiteY27"/>
-                </a:cxn>
-                <a:cxn ang="0">
-                  <a:pos x="connsiteX28" y="connsiteY28"/>
-                </a:cxn>
-                <a:cxn ang="0">
-                  <a:pos x="connsiteX29" y="connsiteY29"/>
-                </a:cxn>
-                <a:cxn ang="0">
-                  <a:pos x="connsiteX30" y="connsiteY30"/>
-                </a:cxn>
-                <a:cxn ang="0">
-                  <a:pos x="connsiteX31" y="connsiteY31"/>
-                </a:cxn>
-                <a:cxn ang="0">
-                  <a:pos x="connsiteX32" y="connsiteY32"/>
-                </a:cxn>
-                <a:cxn ang="0">
-                  <a:pos x="connsiteX33" y="connsiteY33"/>
-                </a:cxn>
-                <a:cxn ang="0">
-                  <a:pos x="connsiteX34" y="connsiteY34"/>
-                </a:cxn>
-                <a:cxn ang="0">
-                  <a:pos x="connsiteX35" y="connsiteY35"/>
-                </a:cxn>
-                <a:cxn ang="0">
-                  <a:pos x="connsiteX36" y="connsiteY36"/>
-                </a:cxn>
-                <a:cxn ang="0">
-                  <a:pos x="connsiteX37" y="connsiteY37"/>
-                </a:cxn>
-                <a:cxn ang="0">
-                  <a:pos x="connsiteX38" y="connsiteY38"/>
-                </a:cxn>
-                <a:cxn ang="0">
-                  <a:pos x="connsiteX39" y="connsiteY39"/>
-                </a:cxn>
-                <a:cxn ang="0">
-                  <a:pos x="connsiteX40" y="connsiteY40"/>
-                </a:cxn>
-                <a:cxn ang="0">
-                  <a:pos x="connsiteX41" y="connsiteY41"/>
-                </a:cxn>
-                <a:cxn ang="0">
-                  <a:pos x="connsiteX42" y="connsiteY42"/>
-                </a:cxn>
-                <a:cxn ang="0">
-                  <a:pos x="connsiteX43" y="connsiteY43"/>
-                </a:cxn>
-                <a:cxn ang="0">
-                  <a:pos x="connsiteX44" y="connsiteY44"/>
-                </a:cxn>
-                <a:cxn ang="0">
-                  <a:pos x="connsiteX45" y="connsiteY45"/>
-                </a:cxn>
-                <a:cxn ang="0">
-                  <a:pos x="connsiteX46" y="connsiteY46"/>
-                </a:cxn>
-                <a:cxn ang="0">
-                  <a:pos x="connsiteX47" y="connsiteY47"/>
-                </a:cxn>
-                <a:cxn ang="0">
-                  <a:pos x="connsiteX48" y="connsiteY48"/>
-                </a:cxn>
-                <a:cxn ang="0">
-                  <a:pos x="connsiteX49" y="connsiteY49"/>
-                </a:cxn>
-                <a:cxn ang="0">
-                  <a:pos x="connsiteX50" y="connsiteY50"/>
-                </a:cxn>
-                <a:cxn ang="0">
-                  <a:pos x="connsiteX51" y="connsiteY51"/>
-                </a:cxn>
-                <a:cxn ang="0">
-                  <a:pos x="connsiteX52" y="connsiteY52"/>
-                </a:cxn>
-                <a:cxn ang="0">
-                  <a:pos x="connsiteX53" y="connsiteY53"/>
-                </a:cxn>
-                <a:cxn ang="0">
-                  <a:pos x="connsiteX54" y="connsiteY54"/>
-                </a:cxn>
-                <a:cxn ang="0">
-                  <a:pos x="connsiteX55" y="connsiteY55"/>
-                </a:cxn>
-                <a:cxn ang="0">
-                  <a:pos x="connsiteX56" y="connsiteY56"/>
-                </a:cxn>
-                <a:cxn ang="0">
-                  <a:pos x="connsiteX57" y="connsiteY57"/>
-                </a:cxn>
-                <a:cxn ang="0">
-                  <a:pos x="connsiteX58" y="connsiteY58"/>
-                </a:cxn>
-                <a:cxn ang="0">
-                  <a:pos x="connsiteX59" y="connsiteY59"/>
-                </a:cxn>
-                <a:cxn ang="0">
-                  <a:pos x="connsiteX60" y="connsiteY60"/>
-                </a:cxn>
-                <a:cxn ang="0">
-                  <a:pos x="connsiteX61" y="connsiteY61"/>
-                </a:cxn>
-                <a:cxn ang="0">
-                  <a:pos x="connsiteX62" y="connsiteY62"/>
-                </a:cxn>
-                <a:cxn ang="0">
-                  <a:pos x="connsiteX63" y="connsiteY63"/>
-                </a:cxn>
-                <a:cxn ang="0">
-                  <a:pos x="connsiteX64" y="connsiteY64"/>
-                </a:cxn>
-                <a:cxn ang="0">
-                  <a:pos x="connsiteX65" y="connsiteY65"/>
-                </a:cxn>
-                <a:cxn ang="0">
-                  <a:pos x="connsiteX66" y="connsiteY66"/>
-                </a:cxn>
-                <a:cxn ang="0">
-                  <a:pos x="connsiteX67" y="connsiteY67"/>
-                </a:cxn>
-                <a:cxn ang="0">
-                  <a:pos x="connsiteX68" y="connsiteY68"/>
-                </a:cxn>
-                <a:cxn ang="0">
-                  <a:pos x="connsiteX69" y="connsiteY69"/>
-                </a:cxn>
-                <a:cxn ang="0">
-                  <a:pos x="connsiteX70" y="connsiteY70"/>
-                </a:cxn>
-                <a:cxn ang="0">
-                  <a:pos x="connsiteX71" y="connsiteY71"/>
-                </a:cxn>
-                <a:cxn ang="0">
-                  <a:pos x="connsiteX72" y="connsiteY72"/>
-                </a:cxn>
-                <a:cxn ang="0">
-                  <a:pos x="connsiteX73" y="connsiteY73"/>
-                </a:cxn>
-                <a:cxn ang="0">
-                  <a:pos x="connsiteX74" y="connsiteY74"/>
-                </a:cxn>
-                <a:cxn ang="0">
-                  <a:pos x="connsiteX75" y="connsiteY75"/>
-                </a:cxn>
-                <a:cxn ang="0">
-                  <a:pos x="connsiteX76" y="connsiteY76"/>
-                </a:cxn>
-                <a:cxn ang="0">
-                  <a:pos x="connsiteX77" y="connsiteY77"/>
-                </a:cxn>
-                <a:cxn ang="0">
-                  <a:pos x="connsiteX78" y="connsiteY78"/>
-                </a:cxn>
-                <a:cxn ang="0">
-                  <a:pos x="connsiteX79" y="connsiteY79"/>
-                </a:cxn>
-                <a:cxn ang="0">
-                  <a:pos x="connsiteX80" y="connsiteY80"/>
-                </a:cxn>
-                <a:cxn ang="0">
-                  <a:pos x="connsiteX81" y="connsiteY81"/>
-                </a:cxn>
-                <a:cxn ang="0">
-                  <a:pos x="connsiteX82" y="connsiteY82"/>
-                </a:cxn>
-                <a:cxn ang="0">
-                  <a:pos x="connsiteX83" y="connsiteY83"/>
-                </a:cxn>
-                <a:cxn ang="0">
-                  <a:pos x="connsiteX84" y="connsiteY84"/>
-                </a:cxn>
-                <a:cxn ang="0">
-                  <a:pos x="connsiteX85" y="connsiteY85"/>
-                </a:cxn>
-              </a:cxnLst>
-              <a:rect l="l" t="t" r="r" b="b"/>
-              <a:pathLst>
-                <a:path w="6373761" h="6874714">
-                  <a:moveTo>
-                    <a:pt x="6373761" y="5771297"/>
-                  </a:moveTo>
-                  <a:lnTo>
-                    <a:pt x="6373761" y="6247960"/>
-                  </a:lnTo>
-                  <a:lnTo>
-                    <a:pt x="6235932" y="6361930"/>
-                  </a:lnTo>
-                  <a:cubicBezTo>
-                    <a:pt x="6143250" y="6437460"/>
-                    <a:pt x="6051059" y="6512200"/>
-                    <a:pt x="5960375" y="6587489"/>
-                  </a:cubicBezTo>
-                  <a:lnTo>
-                    <a:pt x="5822907" y="6701871"/>
-                  </a:lnTo>
-                  <a:cubicBezTo>
-                    <a:pt x="5776123" y="6740385"/>
-                    <a:pt x="5729079" y="6778899"/>
-                    <a:pt x="5681115" y="6816896"/>
-                  </a:cubicBezTo>
-                  <a:lnTo>
-                    <a:pt x="5604096" y="6874714"/>
-                  </a:lnTo>
-                  <a:lnTo>
-                    <a:pt x="4878485" y="6874714"/>
-                  </a:lnTo>
-                  <a:lnTo>
-                    <a:pt x="5006014" y="6800200"/>
-                  </a:lnTo>
-                  <a:cubicBezTo>
-                    <a:pt x="5054354" y="6770429"/>
-                    <a:pt x="5102285" y="6739483"/>
-                    <a:pt x="5149855" y="6707667"/>
-                  </a:cubicBezTo>
-                  <a:cubicBezTo>
-                    <a:pt x="5244993" y="6643906"/>
-                    <a:pt x="5338561" y="6576025"/>
-                    <a:pt x="5431866" y="6506210"/>
-                  </a:cubicBezTo>
-                  <a:cubicBezTo>
-                    <a:pt x="5478386" y="6471304"/>
-                    <a:pt x="5524777" y="6435495"/>
-                    <a:pt x="5571036" y="6399557"/>
-                  </a:cubicBezTo>
-                  <a:lnTo>
-                    <a:pt x="5711649" y="6288912"/>
-                  </a:lnTo>
-                  <a:cubicBezTo>
-                    <a:pt x="5902059" y="6140395"/>
-                    <a:pt x="6093257" y="5998320"/>
-                    <a:pt x="6276589" y="5852379"/>
-                  </a:cubicBezTo>
-                  <a:close/>
-                  <a:moveTo>
-                    <a:pt x="3975975" y="263"/>
-                  </a:moveTo>
-                  <a:cubicBezTo>
-                    <a:pt x="4101550" y="1809"/>
-                    <a:pt x="4226830" y="10149"/>
-                    <a:pt x="4350473" y="24963"/>
-                  </a:cubicBezTo>
-                  <a:cubicBezTo>
-                    <a:pt x="4598149" y="54846"/>
-                    <a:pt x="4842943" y="108687"/>
-                    <a:pt x="5077909" y="189450"/>
-                  </a:cubicBezTo>
-                  <a:cubicBezTo>
-                    <a:pt x="5312876" y="269955"/>
-                    <a:pt x="5537357" y="376867"/>
-                    <a:pt x="5746507" y="505804"/>
-                  </a:cubicBezTo>
-                  <a:cubicBezTo>
-                    <a:pt x="5955527" y="634999"/>
-                    <a:pt x="6148688" y="786864"/>
-                    <a:pt x="6322456" y="956633"/>
-                  </a:cubicBezTo>
-                  <a:lnTo>
-                    <a:pt x="6373761" y="1011863"/>
-                  </a:lnTo>
-                  <a:lnTo>
-                    <a:pt x="6373761" y="1185075"/>
-                  </a:lnTo>
-                  <a:lnTo>
-                    <a:pt x="6359489" y="1169497"/>
-                  </a:lnTo>
-                  <a:cubicBezTo>
-                    <a:pt x="6318811" y="1127602"/>
-                    <a:pt x="6276917" y="1086890"/>
-                    <a:pt x="6233869" y="1047442"/>
-                  </a:cubicBezTo>
-                  <a:cubicBezTo>
-                    <a:pt x="6147509" y="968870"/>
-                    <a:pt x="6056431" y="895448"/>
-                    <a:pt x="5961423" y="827953"/>
-                  </a:cubicBezTo>
-                  <a:cubicBezTo>
-                    <a:pt x="5865891" y="761102"/>
-                    <a:pt x="5766688" y="699403"/>
-                    <a:pt x="5663555" y="645304"/>
-                  </a:cubicBezTo>
-                  <a:cubicBezTo>
-                    <a:pt x="5457943" y="535816"/>
-                    <a:pt x="5238703" y="453894"/>
-                    <a:pt x="5013827" y="397863"/>
-                  </a:cubicBezTo>
-                  <a:cubicBezTo>
-                    <a:pt x="4788953" y="341703"/>
-                    <a:pt x="4558442" y="310917"/>
-                    <a:pt x="4327409" y="302545"/>
-                  </a:cubicBezTo>
-                  <a:cubicBezTo>
-                    <a:pt x="4096111" y="293012"/>
-                    <a:pt x="3867174" y="305893"/>
-                    <a:pt x="3639939" y="338868"/>
-                  </a:cubicBezTo>
-                  <a:cubicBezTo>
-                    <a:pt x="3526585" y="355999"/>
-                    <a:pt x="3413885" y="377254"/>
-                    <a:pt x="3302495" y="403659"/>
-                  </a:cubicBezTo>
-                  <a:cubicBezTo>
-                    <a:pt x="3191107" y="430451"/>
-                    <a:pt x="3080634" y="460978"/>
-                    <a:pt x="2971604" y="496273"/>
-                  </a:cubicBezTo>
-                  <a:cubicBezTo>
-                    <a:pt x="2862573" y="531437"/>
-                    <a:pt x="2754854" y="570852"/>
-                    <a:pt x="2648706" y="614389"/>
-                  </a:cubicBezTo>
-                  <a:cubicBezTo>
-                    <a:pt x="2542690" y="658056"/>
-                    <a:pt x="2438114" y="705714"/>
-                    <a:pt x="2335374" y="757109"/>
-                  </a:cubicBezTo>
-                  <a:cubicBezTo>
-                    <a:pt x="2129894" y="859769"/>
-                    <a:pt x="1931228" y="976855"/>
-                    <a:pt x="1741342" y="1107725"/>
-                  </a:cubicBezTo>
-                  <a:cubicBezTo>
-                    <a:pt x="1694035" y="1140571"/>
-                    <a:pt x="1646858" y="1173933"/>
-                    <a:pt x="1600861" y="1208710"/>
-                  </a:cubicBezTo>
-                  <a:cubicBezTo>
-                    <a:pt x="1577535" y="1225713"/>
-                    <a:pt x="1554732" y="1243361"/>
-                    <a:pt x="1531799" y="1260879"/>
-                  </a:cubicBezTo>
-                  <a:cubicBezTo>
-                    <a:pt x="1508735" y="1278267"/>
-                    <a:pt x="1486064" y="1296171"/>
-                    <a:pt x="1463655" y="1314333"/>
-                  </a:cubicBezTo>
-                  <a:cubicBezTo>
-                    <a:pt x="1373627" y="1386853"/>
-                    <a:pt x="1285564" y="1462077"/>
-                    <a:pt x="1200777" y="1541166"/>
-                  </a:cubicBezTo>
-                  <a:cubicBezTo>
-                    <a:pt x="1030810" y="1698827"/>
-                    <a:pt x="873161" y="1870785"/>
-                    <a:pt x="731501" y="2055754"/>
-                  </a:cubicBezTo>
-                  <a:cubicBezTo>
-                    <a:pt x="660734" y="2148239"/>
-                    <a:pt x="593771" y="2243944"/>
-                    <a:pt x="531393" y="2342739"/>
-                  </a:cubicBezTo>
-                  <a:cubicBezTo>
-                    <a:pt x="470063" y="2442050"/>
-                    <a:pt x="412140" y="2543810"/>
-                    <a:pt x="361033" y="2649046"/>
-                  </a:cubicBezTo>
-                  <a:cubicBezTo>
-                    <a:pt x="347798" y="2675194"/>
-                    <a:pt x="335479" y="2701728"/>
-                    <a:pt x="323292" y="2728263"/>
-                  </a:cubicBezTo>
-                  <a:lnTo>
-                    <a:pt x="304945" y="2768193"/>
-                  </a:lnTo>
-                  <a:lnTo>
-                    <a:pt x="287516" y="2808510"/>
-                  </a:lnTo>
-                  <a:cubicBezTo>
-                    <a:pt x="276115" y="2835432"/>
-                    <a:pt x="264583" y="2862352"/>
-                    <a:pt x="254230" y="2889788"/>
-                  </a:cubicBezTo>
-                  <a:cubicBezTo>
-                    <a:pt x="243877" y="2917224"/>
-                    <a:pt x="232477" y="2944274"/>
-                    <a:pt x="223042" y="2971968"/>
-                  </a:cubicBezTo>
-                  <a:cubicBezTo>
-                    <a:pt x="182679" y="3081970"/>
-                    <a:pt x="148475" y="3194291"/>
-                    <a:pt x="121611" y="3308544"/>
-                  </a:cubicBezTo>
-                  <a:cubicBezTo>
-                    <a:pt x="67096" y="3536534"/>
-                    <a:pt x="39183" y="3771224"/>
-                    <a:pt x="39314" y="4005912"/>
-                  </a:cubicBezTo>
-                  <a:cubicBezTo>
-                    <a:pt x="39969" y="4122871"/>
-                    <a:pt x="51109" y="4239571"/>
-                    <a:pt x="73910" y="4354081"/>
-                  </a:cubicBezTo>
-                  <a:cubicBezTo>
-                    <a:pt x="97892" y="4468334"/>
-                    <a:pt x="132619" y="4580140"/>
-                    <a:pt x="179534" y="4687050"/>
-                  </a:cubicBezTo>
-                  <a:cubicBezTo>
-                    <a:pt x="190673" y="4713972"/>
-                    <a:pt x="203647" y="4740249"/>
-                    <a:pt x="215964" y="4766654"/>
-                  </a:cubicBezTo>
-                  <a:cubicBezTo>
-                    <a:pt x="229332" y="4792674"/>
-                    <a:pt x="242043" y="4818950"/>
-                    <a:pt x="256457" y="4844455"/>
-                  </a:cubicBezTo>
-                  <a:cubicBezTo>
-                    <a:pt x="283978" y="4895978"/>
-                    <a:pt x="314642" y="4945956"/>
-                    <a:pt x="346225" y="4995290"/>
-                  </a:cubicBezTo>
-                  <a:cubicBezTo>
-                    <a:pt x="377676" y="5044752"/>
-                    <a:pt x="411355" y="5092926"/>
-                    <a:pt x="445296" y="5140971"/>
-                  </a:cubicBezTo>
-                  <a:cubicBezTo>
-                    <a:pt x="479760" y="5188630"/>
-                    <a:pt x="515537" y="5235645"/>
-                    <a:pt x="551443" y="5282531"/>
-                  </a:cubicBezTo>
-                  <a:cubicBezTo>
-                    <a:pt x="623387" y="5376434"/>
-                    <a:pt x="698608" y="5468402"/>
-                    <a:pt x="772387" y="5562561"/>
-                  </a:cubicBezTo>
-                  <a:cubicBezTo>
-                    <a:pt x="809472" y="5609448"/>
-                    <a:pt x="846428" y="5656719"/>
-                    <a:pt x="882858" y="5704507"/>
-                  </a:cubicBezTo>
-                  <a:cubicBezTo>
-                    <a:pt x="919159" y="5751909"/>
-                    <a:pt x="955196" y="5802273"/>
-                    <a:pt x="990316" y="5848258"/>
-                  </a:cubicBezTo>
-                  <a:cubicBezTo>
-                    <a:pt x="1025175" y="5895402"/>
-                    <a:pt x="1061736" y="5941129"/>
-                    <a:pt x="1097774" y="5987114"/>
-                  </a:cubicBezTo>
-                  <a:cubicBezTo>
-                    <a:pt x="1134860" y="6032326"/>
-                    <a:pt x="1171684" y="6077536"/>
-                    <a:pt x="1210080" y="6121203"/>
-                  </a:cubicBezTo>
-                  <a:cubicBezTo>
-                    <a:pt x="1286350" y="6209051"/>
-                    <a:pt x="1365632" y="6293677"/>
-                    <a:pt x="1448192" y="6374054"/>
-                  </a:cubicBezTo>
-                  <a:cubicBezTo>
-                    <a:pt x="1613572" y="6534420"/>
-                    <a:pt x="1792057" y="6677526"/>
-                    <a:pt x="1982991" y="6796158"/>
-                  </a:cubicBezTo>
-                  <a:lnTo>
-                    <a:pt x="2118475" y="6874714"/>
-                  </a:lnTo>
-                  <a:lnTo>
-                    <a:pt x="1569874" y="6874714"/>
-                  </a:lnTo>
-                  <a:lnTo>
-                    <a:pt x="1507802" y="6817815"/>
-                  </a:lnTo>
-                  <a:cubicBezTo>
-                    <a:pt x="1418412" y="6730595"/>
-                    <a:pt x="1334903" y="6638562"/>
-                    <a:pt x="1256865" y="6543437"/>
-                  </a:cubicBezTo>
-                  <a:cubicBezTo>
-                    <a:pt x="1179155" y="6447861"/>
-                    <a:pt x="1106817" y="6349194"/>
-                    <a:pt x="1038410" y="6248722"/>
-                  </a:cubicBezTo>
-                  <a:cubicBezTo>
-                    <a:pt x="969873" y="6148253"/>
-                    <a:pt x="905922" y="6045592"/>
-                    <a:pt x="845380" y="5941386"/>
-                  </a:cubicBezTo>
-                  <a:cubicBezTo>
-                    <a:pt x="814453" y="5888704"/>
-                    <a:pt x="786147" y="5839370"/>
-                    <a:pt x="755351" y="5788877"/>
-                  </a:cubicBezTo>
-                  <a:cubicBezTo>
-                    <a:pt x="724817" y="5738771"/>
-                    <a:pt x="693760" y="5688665"/>
-                    <a:pt x="661784" y="5638944"/>
-                  </a:cubicBezTo>
-                  <a:lnTo>
-                    <a:pt x="466525" y="5340366"/>
-                  </a:lnTo>
-                  <a:cubicBezTo>
-                    <a:pt x="434156" y="5290131"/>
-                    <a:pt x="402181" y="5239639"/>
-                    <a:pt x="370992" y="5188502"/>
-                  </a:cubicBezTo>
-                  <a:cubicBezTo>
-                    <a:pt x="339803" y="5137364"/>
-                    <a:pt x="308876" y="5086099"/>
-                    <a:pt x="280046" y="5033287"/>
-                  </a:cubicBezTo>
-                  <a:cubicBezTo>
-                    <a:pt x="222255" y="4928179"/>
-                    <a:pt x="169181" y="4819982"/>
-                    <a:pt x="126853" y="4707660"/>
-                  </a:cubicBezTo>
-                  <a:cubicBezTo>
-                    <a:pt x="83739" y="4595725"/>
-                    <a:pt x="51764" y="4479670"/>
-                    <a:pt x="30272" y="4362068"/>
-                  </a:cubicBezTo>
-                  <a:cubicBezTo>
-                    <a:pt x="9698" y="4244466"/>
-                    <a:pt x="0" y="4125060"/>
-                    <a:pt x="0" y="4005912"/>
-                  </a:cubicBezTo>
-                  <a:cubicBezTo>
-                    <a:pt x="1704" y="3530867"/>
-                    <a:pt x="95140" y="3057110"/>
-                    <a:pt x="270480" y="2610532"/>
-                  </a:cubicBezTo>
-                  <a:cubicBezTo>
-                    <a:pt x="314511" y="2498984"/>
-                    <a:pt x="362212" y="2388466"/>
-                    <a:pt x="415942" y="2280526"/>
-                  </a:cubicBezTo>
-                  <a:cubicBezTo>
-                    <a:pt x="468884" y="2172197"/>
-                    <a:pt x="527199" y="2066188"/>
-                    <a:pt x="590102" y="1962626"/>
-                  </a:cubicBezTo>
-                  <a:cubicBezTo>
-                    <a:pt x="716037" y="1755631"/>
-                    <a:pt x="859794" y="1557653"/>
-                    <a:pt x="1020719" y="1373070"/>
-                  </a:cubicBezTo>
-                  <a:cubicBezTo>
-                    <a:pt x="1101575" y="1281101"/>
-                    <a:pt x="1185969" y="1191838"/>
-                    <a:pt x="1275080" y="1107081"/>
-                  </a:cubicBezTo>
-                  <a:cubicBezTo>
-                    <a:pt x="1297227" y="1085699"/>
-                    <a:pt x="1319504" y="1064575"/>
-                    <a:pt x="1342437" y="1043965"/>
-                  </a:cubicBezTo>
-                  <a:cubicBezTo>
-                    <a:pt x="1365240" y="1023226"/>
-                    <a:pt x="1387648" y="1002102"/>
-                    <a:pt x="1411106" y="982138"/>
-                  </a:cubicBezTo>
-                  <a:cubicBezTo>
-                    <a:pt x="1457497" y="941563"/>
-                    <a:pt x="1505065" y="902276"/>
-                    <a:pt x="1553029" y="863376"/>
-                  </a:cubicBezTo>
-                  <a:cubicBezTo>
-                    <a:pt x="1745798" y="708806"/>
-                    <a:pt x="1954030" y="571882"/>
-                    <a:pt x="2173401" y="454409"/>
-                  </a:cubicBezTo>
-                  <a:cubicBezTo>
-                    <a:pt x="2612013" y="219334"/>
-                    <a:pt x="3099505" y="65666"/>
-                    <a:pt x="3599708" y="16332"/>
-                  </a:cubicBezTo>
-                  <a:cubicBezTo>
-                    <a:pt x="3724530" y="3966"/>
-                    <a:pt x="3850400" y="-1283"/>
-                    <a:pt x="3975975" y="263"/>
-                  </a:cubicBezTo>
-                  <a:close/>
-                </a:path>
-              </a:pathLst>
-            </a:custGeom>
-            <a:gradFill>
-              <a:gsLst>
-                <a:gs pos="2000">
-                  <a:schemeClr val="bg1">
-                    <a:alpha val="10000"/>
-                  </a:schemeClr>
-                </a:gs>
-                <a:gs pos="16000">
-                  <a:schemeClr val="accent6">
-                    <a:alpha val="10000"/>
-                  </a:schemeClr>
-                </a:gs>
-                <a:gs pos="100000">
-                  <a:schemeClr val="bg1">
-                    <a:alpha val="10000"/>
-                  </a:schemeClr>
-                </a:gs>
-                <a:gs pos="85000">
-                  <a:schemeClr val="accent1">
-                    <a:alpha val="10000"/>
-                  </a:schemeClr>
-                </a:gs>
-              </a:gsLst>
-              <a:lin ang="12000000" scaled="0"/>
-            </a:gradFill>
-            <a:ln>
-              <a:noFill/>
-            </a:ln>
-          </p:spPr>
-          <p:style>
-            <a:lnRef idx="2">
-              <a:schemeClr val="accent1">
-                <a:shade val="50000"/>
-              </a:schemeClr>
-            </a:lnRef>
-            <a:fillRef idx="1">
-              <a:schemeClr val="accent1"/>
-            </a:fillRef>
-            <a:effectRef idx="0">
-              <a:schemeClr val="accent1"/>
-            </a:effectRef>
-            <a:fontRef idx="minor">
-              <a:schemeClr val="lt1"/>
-            </a:fontRef>
-          </p:style>
-          <p:txBody>
-            <a:bodyPr rtlCol="0" anchor="ctr"/>
-            <a:lstStyle/>
-            <a:p>
-              <a:pPr algn="ctr"/>
-              <a:endParaRPr lang="en-US"/>
-            </a:p>
-          </p:txBody>
-        </p:sp>
-        <p:sp>
-          <p:nvSpPr>
-            <p:cNvPr id="38" name="Freeform: Shape 37">
-              <a:extLst>
-                <a:ext uri="{FF2B5EF4-FFF2-40B4-BE49-F238E27FC236}">
-                  <a16:creationId xmlns:a16="http://schemas.microsoft.com/office/drawing/2014/main" id="{61023DD2-2E6F-4419-B404-80F08460BEA5}"/>
-                </a:ext>
-                <a:ext uri="{C183D7F6-B498-43B3-948B-1728B52AA6E4}">
-                  <adec:decorative xmlns:adec="http://schemas.microsoft.com/office/drawing/2017/decorative" val="1"/>
-                </a:ext>
-              </a:extLst>
-            </p:cNvPr>
-            <p:cNvSpPr/>
-            <p:nvPr>
-              <p:extLst>
-                <p:ext uri="{386F3935-93C4-4BCD-93E2-E3B085C9AB24}">
-                  <p16:designElem xmlns:p16="http://schemas.microsoft.com/office/powerpoint/2015/main" val="1"/>
-                </p:ext>
-              </p:extLst>
-            </p:nvPr>
-          </p:nvSpPr>
-          <p:spPr>
-            <a:xfrm>
-              <a:off x="5865276" y="313387"/>
-              <a:ext cx="6326724" cy="6561326"/>
-            </a:xfrm>
-            <a:custGeom>
-              <a:avLst/>
-              <a:gdLst>
-                <a:gd name="connsiteX0" fmla="*/ 6326724 w 6326724"/>
-                <a:gd name="connsiteY0" fmla="*/ 5020808 h 6561326"/>
-                <a:gd name="connsiteX1" fmla="*/ 6326724 w 6326724"/>
-                <a:gd name="connsiteY1" fmla="*/ 5698632 h 6561326"/>
-                <a:gd name="connsiteX2" fmla="*/ 6067438 w 6326724"/>
-                <a:gd name="connsiteY2" fmla="*/ 5902509 h 6561326"/>
-                <a:gd name="connsiteX3" fmla="*/ 5799974 w 6326724"/>
-                <a:gd name="connsiteY3" fmla="*/ 6102017 h 6561326"/>
-                <a:gd name="connsiteX4" fmla="*/ 5665258 w 6326724"/>
-                <a:gd name="connsiteY4" fmla="*/ 6202100 h 6561326"/>
-                <a:gd name="connsiteX5" fmla="*/ 5526873 w 6326724"/>
-                <a:gd name="connsiteY5" fmla="*/ 6302828 h 6561326"/>
-                <a:gd name="connsiteX6" fmla="*/ 5385080 w 6326724"/>
-                <a:gd name="connsiteY6" fmla="*/ 6402268 h 6561326"/>
-                <a:gd name="connsiteX7" fmla="*/ 5238833 w 6326724"/>
-                <a:gd name="connsiteY7" fmla="*/ 6498875 h 6561326"/>
-                <a:gd name="connsiteX8" fmla="*/ 5138040 w 6326724"/>
-                <a:gd name="connsiteY8" fmla="*/ 6561326 h 6561326"/>
-                <a:gd name="connsiteX9" fmla="*/ 3946072 w 6326724"/>
-                <a:gd name="connsiteY9" fmla="*/ 6561326 h 6561326"/>
-                <a:gd name="connsiteX10" fmla="*/ 3976009 w 6326724"/>
-                <a:gd name="connsiteY10" fmla="*/ 6555242 h 6561326"/>
-                <a:gd name="connsiteX11" fmla="*/ 4404855 w 6326724"/>
-                <a:gd name="connsiteY11" fmla="*/ 6399048 h 6561326"/>
-                <a:gd name="connsiteX12" fmla="*/ 4938868 w 6326724"/>
-                <a:gd name="connsiteY12" fmla="*/ 6072132 h 6561326"/>
-                <a:gd name="connsiteX13" fmla="*/ 5068342 w 6326724"/>
-                <a:gd name="connsiteY13" fmla="*/ 5976042 h 6561326"/>
-                <a:gd name="connsiteX14" fmla="*/ 5197816 w 6326724"/>
-                <a:gd name="connsiteY14" fmla="*/ 5876730 h 6561326"/>
-                <a:gd name="connsiteX15" fmla="*/ 5460039 w 6326724"/>
-                <a:gd name="connsiteY15" fmla="*/ 5670637 h 6561326"/>
-                <a:gd name="connsiteX16" fmla="*/ 5999033 w 6326724"/>
-                <a:gd name="connsiteY16" fmla="*/ 5271718 h 6561326"/>
-                <a:gd name="connsiteX17" fmla="*/ 6258766 w 6326724"/>
-                <a:gd name="connsiteY17" fmla="*/ 5077603 h 6561326"/>
-                <a:gd name="connsiteX18" fmla="*/ 4139342 w 6326724"/>
-                <a:gd name="connsiteY18" fmla="*/ 440 h 6561326"/>
-                <a:gd name="connsiteX19" fmla="*/ 4315744 w 6326724"/>
-                <a:gd name="connsiteY19" fmla="*/ 6808 h 6561326"/>
-                <a:gd name="connsiteX20" fmla="*/ 5015400 w 6326724"/>
-                <a:gd name="connsiteY20" fmla="*/ 113591 h 6561326"/>
-                <a:gd name="connsiteX21" fmla="*/ 5681114 w 6326724"/>
-                <a:gd name="connsiteY21" fmla="*/ 361418 h 6561326"/>
-                <a:gd name="connsiteX22" fmla="*/ 6270952 w 6326724"/>
-                <a:gd name="connsiteY22" fmla="*/ 755441 h 6561326"/>
-                <a:gd name="connsiteX23" fmla="*/ 6326724 w 6326724"/>
-                <a:gd name="connsiteY23" fmla="*/ 807432 h 6561326"/>
-                <a:gd name="connsiteX24" fmla="*/ 6326724 w 6326724"/>
-                <a:gd name="connsiteY24" fmla="*/ 1231565 h 6561326"/>
-                <a:gd name="connsiteX25" fmla="*/ 6302093 w 6326724"/>
-                <a:gd name="connsiteY25" fmla="*/ 1203002 h 6561326"/>
-                <a:gd name="connsiteX26" fmla="*/ 6066914 w 6326724"/>
-                <a:gd name="connsiteY26" fmla="*/ 989616 h 6561326"/>
-                <a:gd name="connsiteX27" fmla="*/ 5533688 w 6326724"/>
-                <a:gd name="connsiteY27" fmla="*/ 647242 h 6561326"/>
-                <a:gd name="connsiteX28" fmla="*/ 4933626 w 6326724"/>
-                <a:gd name="connsiteY28" fmla="*/ 432262 h 6561326"/>
-                <a:gd name="connsiteX29" fmla="*/ 4296873 w 6326724"/>
-                <a:gd name="connsiteY29" fmla="*/ 343126 h 6561326"/>
-                <a:gd name="connsiteX30" fmla="*/ 3651602 w 6326724"/>
-                <a:gd name="connsiteY30" fmla="*/ 365797 h 6561326"/>
-                <a:gd name="connsiteX31" fmla="*/ 3018256 w 6326724"/>
-                <a:gd name="connsiteY31" fmla="*/ 496666 h 6561326"/>
-                <a:gd name="connsiteX32" fmla="*/ 2412429 w 6326724"/>
-                <a:gd name="connsiteY32" fmla="*/ 724399 h 6561326"/>
-                <a:gd name="connsiteX33" fmla="*/ 1329857 w 6326724"/>
-                <a:gd name="connsiteY33" fmla="*/ 1424086 h 6561326"/>
-                <a:gd name="connsiteX34" fmla="*/ 887314 w 6326724"/>
-                <a:gd name="connsiteY34" fmla="*/ 1891015 h 6561326"/>
-                <a:gd name="connsiteX35" fmla="*/ 537420 w 6326724"/>
-                <a:gd name="connsiteY35" fmla="*/ 2427245 h 6561326"/>
-                <a:gd name="connsiteX36" fmla="*/ 299965 w 6326724"/>
-                <a:gd name="connsiteY36" fmla="*/ 3020021 h 6561326"/>
-                <a:gd name="connsiteX37" fmla="*/ 213606 w 6326724"/>
-                <a:gd name="connsiteY37" fmla="*/ 3651953 h 6561326"/>
-                <a:gd name="connsiteX38" fmla="*/ 250036 w 6326724"/>
-                <a:gd name="connsiteY38" fmla="*/ 3961352 h 6561326"/>
-                <a:gd name="connsiteX39" fmla="*/ 357625 w 6326724"/>
-                <a:gd name="connsiteY39" fmla="*/ 4250783 h 6561326"/>
-                <a:gd name="connsiteX40" fmla="*/ 432715 w 6326724"/>
-                <a:gd name="connsiteY40" fmla="*/ 4387063 h 6561326"/>
-                <a:gd name="connsiteX41" fmla="*/ 518943 w 6326724"/>
-                <a:gd name="connsiteY41" fmla="*/ 4518962 h 6561326"/>
-                <a:gd name="connsiteX42" fmla="*/ 718133 w 6326724"/>
-                <a:gd name="connsiteY42" fmla="*/ 4773874 h 6561326"/>
-                <a:gd name="connsiteX43" fmla="*/ 933704 w 6326724"/>
-                <a:gd name="connsiteY43" fmla="*/ 5030717 h 6561326"/>
-                <a:gd name="connsiteX44" fmla="*/ 1040900 w 6326724"/>
-                <a:gd name="connsiteY44" fmla="*/ 5164806 h 6561326"/>
-                <a:gd name="connsiteX45" fmla="*/ 1092401 w 6326724"/>
-                <a:gd name="connsiteY45" fmla="*/ 5230628 h 6561326"/>
-                <a:gd name="connsiteX46" fmla="*/ 1142854 w 6326724"/>
-                <a:gd name="connsiteY46" fmla="*/ 5293615 h 6561326"/>
-                <a:gd name="connsiteX47" fmla="*/ 1576354 w 6326724"/>
-                <a:gd name="connsiteY47" fmla="*/ 5759128 h 6561326"/>
-                <a:gd name="connsiteX48" fmla="*/ 1806865 w 6326724"/>
-                <a:gd name="connsiteY48" fmla="*/ 5968571 h 6561326"/>
-                <a:gd name="connsiteX49" fmla="*/ 2048253 w 6326724"/>
-                <a:gd name="connsiteY49" fmla="*/ 6161654 h 6561326"/>
-                <a:gd name="connsiteX50" fmla="*/ 2587506 w 6326724"/>
-                <a:gd name="connsiteY50" fmla="*/ 6467059 h 6561326"/>
-                <a:gd name="connsiteX51" fmla="*/ 2889176 w 6326724"/>
-                <a:gd name="connsiteY51" fmla="*/ 6553360 h 6561326"/>
-                <a:gd name="connsiteX52" fmla="*/ 2929698 w 6326724"/>
-                <a:gd name="connsiteY52" fmla="*/ 6561326 h 6561326"/>
-                <a:gd name="connsiteX53" fmla="*/ 1816374 w 6326724"/>
-                <a:gd name="connsiteY53" fmla="*/ 6561326 h 6561326"/>
-                <a:gd name="connsiteX54" fmla="*/ 1787601 w 6326724"/>
-                <a:gd name="connsiteY54" fmla="*/ 6545761 h 6561326"/>
-                <a:gd name="connsiteX55" fmla="*/ 1225544 w 6326724"/>
-                <a:gd name="connsiteY55" fmla="*/ 6094158 h 6561326"/>
-                <a:gd name="connsiteX56" fmla="*/ 997654 w 6326724"/>
-                <a:gd name="connsiteY56" fmla="*/ 5822374 h 6561326"/>
-                <a:gd name="connsiteX57" fmla="*/ 798596 w 6326724"/>
-                <a:gd name="connsiteY57" fmla="*/ 5534615 h 6561326"/>
-                <a:gd name="connsiteX58" fmla="*/ 752075 w 6326724"/>
-                <a:gd name="connsiteY58" fmla="*/ 5461324 h 6561326"/>
-                <a:gd name="connsiteX59" fmla="*/ 707650 w 6326724"/>
-                <a:gd name="connsiteY59" fmla="*/ 5390221 h 6561326"/>
-                <a:gd name="connsiteX60" fmla="*/ 619980 w 6326724"/>
-                <a:gd name="connsiteY60" fmla="*/ 5252396 h 6561326"/>
-                <a:gd name="connsiteX61" fmla="*/ 438349 w 6326724"/>
-                <a:gd name="connsiteY61" fmla="*/ 4970822 h 6561326"/>
-                <a:gd name="connsiteX62" fmla="*/ 261044 w 6326724"/>
-                <a:gd name="connsiteY62" fmla="*/ 4673145 h 6561326"/>
-                <a:gd name="connsiteX63" fmla="*/ 181107 w 6326724"/>
-                <a:gd name="connsiteY63" fmla="*/ 4515356 h 6561326"/>
-                <a:gd name="connsiteX64" fmla="*/ 113224 w 6326724"/>
-                <a:gd name="connsiteY64" fmla="*/ 4350223 h 6561326"/>
-                <a:gd name="connsiteX65" fmla="*/ 61199 w 6326724"/>
-                <a:gd name="connsiteY65" fmla="*/ 4178908 h 6561326"/>
-                <a:gd name="connsiteX66" fmla="*/ 41804 w 6326724"/>
-                <a:gd name="connsiteY66" fmla="*/ 4091577 h 6561326"/>
-                <a:gd name="connsiteX67" fmla="*/ 33287 w 6326724"/>
-                <a:gd name="connsiteY67" fmla="*/ 4047781 h 6561326"/>
-                <a:gd name="connsiteX68" fmla="*/ 26209 w 6326724"/>
-                <a:gd name="connsiteY68" fmla="*/ 4003858 h 6561326"/>
-                <a:gd name="connsiteX69" fmla="*/ 0 w 6326724"/>
-                <a:gd name="connsiteY69" fmla="*/ 3651953 h 6561326"/>
-                <a:gd name="connsiteX70" fmla="*/ 72731 w 6326724"/>
-                <a:gd name="connsiteY70" fmla="*/ 2966307 h 6561326"/>
-                <a:gd name="connsiteX71" fmla="*/ 291316 w 6326724"/>
-                <a:gd name="connsiteY71" fmla="*/ 2309385 h 6561326"/>
-                <a:gd name="connsiteX72" fmla="*/ 1110878 w 6326724"/>
-                <a:gd name="connsiteY72" fmla="*/ 1193776 h 6561326"/>
-                <a:gd name="connsiteX73" fmla="*/ 1654327 w 6326724"/>
-                <a:gd name="connsiteY73" fmla="*/ 756730 h 6561326"/>
-                <a:gd name="connsiteX74" fmla="*/ 2261727 w 6326724"/>
-                <a:gd name="connsiteY74" fmla="*/ 409720 h 6561326"/>
-                <a:gd name="connsiteX75" fmla="*/ 3610060 w 6326724"/>
-                <a:gd name="connsiteY75" fmla="*/ 27032 h 6561326"/>
-                <a:gd name="connsiteX76" fmla="*/ 4139342 w 6326724"/>
-                <a:gd name="connsiteY76" fmla="*/ 440 h 6561326"/>
-              </a:gdLst>
-              <a:ahLst/>
-              <a:cxnLst>
-                <a:cxn ang="0">
-                  <a:pos x="connsiteX0" y="connsiteY0"/>
-                </a:cxn>
-                <a:cxn ang="0">
-                  <a:pos x="connsiteX1" y="connsiteY1"/>
-                </a:cxn>
-                <a:cxn ang="0">
-                  <a:pos x="connsiteX2" y="connsiteY2"/>
-                </a:cxn>
-                <a:cxn ang="0">
-                  <a:pos x="connsiteX3" y="connsiteY3"/>
-                </a:cxn>
-                <a:cxn ang="0">
-                  <a:pos x="connsiteX4" y="connsiteY4"/>
-                </a:cxn>
-                <a:cxn ang="0">
-                  <a:pos x="connsiteX5" y="connsiteY5"/>
-                </a:cxn>
-                <a:cxn ang="0">
-                  <a:pos x="connsiteX6" y="connsiteY6"/>
-                </a:cxn>
-                <a:cxn ang="0">
-                  <a:pos x="connsiteX7" y="connsiteY7"/>
-                </a:cxn>
-                <a:cxn ang="0">
-                  <a:pos x="connsiteX8" y="connsiteY8"/>
-                </a:cxn>
-                <a:cxn ang="0">
-                  <a:pos x="connsiteX9" y="connsiteY9"/>
-                </a:cxn>
-                <a:cxn ang="0">
-                  <a:pos x="connsiteX10" y="connsiteY10"/>
-                </a:cxn>
-                <a:cxn ang="0">
-                  <a:pos x="connsiteX11" y="connsiteY11"/>
-                </a:cxn>
-                <a:cxn ang="0">
-                  <a:pos x="connsiteX12" y="connsiteY12"/>
-                </a:cxn>
-                <a:cxn ang="0">
-                  <a:pos x="connsiteX13" y="connsiteY13"/>
-                </a:cxn>
-                <a:cxn ang="0">
-                  <a:pos x="connsiteX14" y="connsiteY14"/>
-                </a:cxn>
-                <a:cxn ang="0">
-                  <a:pos x="connsiteX15" y="connsiteY15"/>
-                </a:cxn>
-                <a:cxn ang="0">
-                  <a:pos x="connsiteX16" y="connsiteY16"/>
-                </a:cxn>
-                <a:cxn ang="0">
-                  <a:pos x="connsiteX17" y="connsiteY17"/>
-                </a:cxn>
-                <a:cxn ang="0">
-                  <a:pos x="connsiteX18" y="connsiteY18"/>
-                </a:cxn>
-                <a:cxn ang="0">
-                  <a:pos x="connsiteX19" y="connsiteY19"/>
-                </a:cxn>
-                <a:cxn ang="0">
-                  <a:pos x="connsiteX20" y="connsiteY20"/>
-                </a:cxn>
-                <a:cxn ang="0">
-                  <a:pos x="connsiteX21" y="connsiteY21"/>
-                </a:cxn>
-                <a:cxn ang="0">
-                  <a:pos x="connsiteX22" y="connsiteY22"/>
-                </a:cxn>
-                <a:cxn ang="0">
-                  <a:pos x="connsiteX23" y="connsiteY23"/>
-                </a:cxn>
-                <a:cxn ang="0">
-                  <a:pos x="connsiteX24" y="connsiteY24"/>
-                </a:cxn>
-                <a:cxn ang="0">
-                  <a:pos x="connsiteX25" y="connsiteY25"/>
-                </a:cxn>
-                <a:cxn ang="0">
-                  <a:pos x="connsiteX26" y="connsiteY26"/>
-                </a:cxn>
-                <a:cxn ang="0">
-                  <a:pos x="connsiteX27" y="connsiteY27"/>
-                </a:cxn>
-                <a:cxn ang="0">
-                  <a:pos x="connsiteX28" y="connsiteY28"/>
-                </a:cxn>
-                <a:cxn ang="0">
-                  <a:pos x="connsiteX29" y="connsiteY29"/>
-                </a:cxn>
-                <a:cxn ang="0">
-                  <a:pos x="connsiteX30" y="connsiteY30"/>
-                </a:cxn>
-                <a:cxn ang="0">
-                  <a:pos x="connsiteX31" y="connsiteY31"/>
-                </a:cxn>
-                <a:cxn ang="0">
-                  <a:pos x="connsiteX32" y="connsiteY32"/>
-                </a:cxn>
-                <a:cxn ang="0">
-                  <a:pos x="connsiteX33" y="connsiteY33"/>
-                </a:cxn>
-                <a:cxn ang="0">
-                  <a:pos x="connsiteX34" y="connsiteY34"/>
-                </a:cxn>
-                <a:cxn ang="0">
-                  <a:pos x="connsiteX35" y="connsiteY35"/>
-                </a:cxn>
-                <a:cxn ang="0">
-                  <a:pos x="connsiteX36" y="connsiteY36"/>
-                </a:cxn>
-                <a:cxn ang="0">
-                  <a:pos x="connsiteX37" y="connsiteY37"/>
-                </a:cxn>
-                <a:cxn ang="0">
-                  <a:pos x="connsiteX38" y="connsiteY38"/>
-                </a:cxn>
-                <a:cxn ang="0">
-                  <a:pos x="connsiteX39" y="connsiteY39"/>
-                </a:cxn>
-                <a:cxn ang="0">
-                  <a:pos x="connsiteX40" y="connsiteY40"/>
-                </a:cxn>
-                <a:cxn ang="0">
-                  <a:pos x="connsiteX41" y="connsiteY41"/>
-                </a:cxn>
-                <a:cxn ang="0">
-                  <a:pos x="connsiteX42" y="connsiteY42"/>
-                </a:cxn>
-                <a:cxn ang="0">
-                  <a:pos x="connsiteX43" y="connsiteY43"/>
-                </a:cxn>
-                <a:cxn ang="0">
-                  <a:pos x="connsiteX44" y="connsiteY44"/>
-                </a:cxn>
-                <a:cxn ang="0">
-                  <a:pos x="connsiteX45" y="connsiteY45"/>
-                </a:cxn>
-                <a:cxn ang="0">
-                  <a:pos x="connsiteX46" y="connsiteY46"/>
-                </a:cxn>
-                <a:cxn ang="0">
-                  <a:pos x="connsiteX47" y="connsiteY47"/>
-                </a:cxn>
-                <a:cxn ang="0">
-                  <a:pos x="connsiteX48" y="connsiteY48"/>
-                </a:cxn>
-                <a:cxn ang="0">
-                  <a:pos x="connsiteX49" y="connsiteY49"/>
-                </a:cxn>
-                <a:cxn ang="0">
-                  <a:pos x="connsiteX50" y="connsiteY50"/>
-                </a:cxn>
-                <a:cxn ang="0">
-                  <a:pos x="connsiteX51" y="connsiteY51"/>
-                </a:cxn>
-                <a:cxn ang="0">
-                  <a:pos x="connsiteX52" y="connsiteY52"/>
-                </a:cxn>
-                <a:cxn ang="0">
-                  <a:pos x="connsiteX53" y="connsiteY53"/>
-                </a:cxn>
-                <a:cxn ang="0">
-                  <a:pos x="connsiteX54" y="connsiteY54"/>
-                </a:cxn>
-                <a:cxn ang="0">
-                  <a:pos x="connsiteX55" y="connsiteY55"/>
-                </a:cxn>
-                <a:cxn ang="0">
-                  <a:pos x="connsiteX56" y="connsiteY56"/>
-                </a:cxn>
-                <a:cxn ang="0">
-                  <a:pos x="connsiteX57" y="connsiteY57"/>
-                </a:cxn>
-                <a:cxn ang="0">
-                  <a:pos x="connsiteX58" y="connsiteY58"/>
-                </a:cxn>
-                <a:cxn ang="0">
-                  <a:pos x="connsiteX59" y="connsiteY59"/>
-                </a:cxn>
-                <a:cxn ang="0">
-                  <a:pos x="connsiteX60" y="connsiteY60"/>
-                </a:cxn>
-                <a:cxn ang="0">
-                  <a:pos x="connsiteX61" y="connsiteY61"/>
-                </a:cxn>
-                <a:cxn ang="0">
-                  <a:pos x="connsiteX62" y="connsiteY62"/>
-                </a:cxn>
-                <a:cxn ang="0">
-                  <a:pos x="connsiteX63" y="connsiteY63"/>
-                </a:cxn>
-                <a:cxn ang="0">
-                  <a:pos x="connsiteX64" y="connsiteY64"/>
-                </a:cxn>
-                <a:cxn ang="0">
-                  <a:pos x="connsiteX65" y="connsiteY65"/>
-                </a:cxn>
-                <a:cxn ang="0">
-                  <a:pos x="connsiteX66" y="connsiteY66"/>
-                </a:cxn>
-                <a:cxn ang="0">
-                  <a:pos x="connsiteX67" y="connsiteY67"/>
-                </a:cxn>
-                <a:cxn ang="0">
-                  <a:pos x="connsiteX68" y="connsiteY68"/>
-                </a:cxn>
-                <a:cxn ang="0">
-                  <a:pos x="connsiteX69" y="connsiteY69"/>
-                </a:cxn>
-                <a:cxn ang="0">
-                  <a:pos x="connsiteX70" y="connsiteY70"/>
-                </a:cxn>
-                <a:cxn ang="0">
-                  <a:pos x="connsiteX71" y="connsiteY71"/>
-                </a:cxn>
-                <a:cxn ang="0">
-                  <a:pos x="connsiteX72" y="connsiteY72"/>
-                </a:cxn>
-                <a:cxn ang="0">
-                  <a:pos x="connsiteX73" y="connsiteY73"/>
-                </a:cxn>
-                <a:cxn ang="0">
-                  <a:pos x="connsiteX74" y="connsiteY74"/>
-                </a:cxn>
-                <a:cxn ang="0">
-                  <a:pos x="connsiteX75" y="connsiteY75"/>
-                </a:cxn>
-                <a:cxn ang="0">
-                  <a:pos x="connsiteX76" y="connsiteY76"/>
-                </a:cxn>
-              </a:cxnLst>
-              <a:rect l="l" t="t" r="r" b="b"/>
-              <a:pathLst>
-                <a:path w="6326724" h="6561326">
-                  <a:moveTo>
-                    <a:pt x="6326724" y="5020808"/>
-                  </a:moveTo>
-                  <a:lnTo>
-                    <a:pt x="6326724" y="5698632"/>
-                  </a:lnTo>
-                  <a:lnTo>
-                    <a:pt x="6067438" y="5902509"/>
-                  </a:lnTo>
-                  <a:cubicBezTo>
-                    <a:pt x="5977868" y="5970407"/>
-                    <a:pt x="5888364" y="6036453"/>
-                    <a:pt x="5799974" y="6102017"/>
-                  </a:cubicBezTo>
-                  <a:lnTo>
-                    <a:pt x="5665258" y="6202100"/>
-                  </a:lnTo>
-                  <a:cubicBezTo>
-                    <a:pt x="5619654" y="6235719"/>
-                    <a:pt x="5573656" y="6269596"/>
-                    <a:pt x="5526873" y="6302828"/>
-                  </a:cubicBezTo>
-                  <a:cubicBezTo>
-                    <a:pt x="5480220" y="6336189"/>
-                    <a:pt x="5433044" y="6369423"/>
-                    <a:pt x="5385080" y="6402268"/>
-                  </a:cubicBezTo>
-                  <a:cubicBezTo>
-                    <a:pt x="5336988" y="6434857"/>
-                    <a:pt x="5288500" y="6467187"/>
-                    <a:pt x="5238833" y="6498875"/>
-                  </a:cubicBezTo>
-                  <a:lnTo>
-                    <a:pt x="5138040" y="6561326"/>
-                  </a:lnTo>
-                  <a:lnTo>
-                    <a:pt x="3946072" y="6561326"/>
-                  </a:lnTo>
-                  <a:lnTo>
-                    <a:pt x="3976009" y="6555242"/>
-                  </a:lnTo>
-                  <a:cubicBezTo>
-                    <a:pt x="4123712" y="6519227"/>
-                    <a:pt x="4266863" y="6466383"/>
-                    <a:pt x="4404855" y="6399048"/>
-                  </a:cubicBezTo>
-                  <a:cubicBezTo>
-                    <a:pt x="4589500" y="6310299"/>
-                    <a:pt x="4765232" y="6196690"/>
-                    <a:pt x="4938868" y="6072132"/>
-                  </a:cubicBezTo>
-                  <a:cubicBezTo>
-                    <a:pt x="4982245" y="6041089"/>
-                    <a:pt x="5025359" y="6008630"/>
-                    <a:pt x="5068342" y="5976042"/>
-                  </a:cubicBezTo>
-                  <a:cubicBezTo>
-                    <a:pt x="5111588" y="5943453"/>
-                    <a:pt x="5154702" y="5910349"/>
-                    <a:pt x="5197816" y="5876730"/>
-                  </a:cubicBezTo>
-                  <a:lnTo>
-                    <a:pt x="5460039" y="5670637"/>
-                  </a:lnTo>
-                  <a:cubicBezTo>
-                    <a:pt x="5639966" y="5530365"/>
-                    <a:pt x="5821596" y="5399753"/>
-                    <a:pt x="5999033" y="5271718"/>
-                  </a:cubicBezTo>
-                  <a:cubicBezTo>
-                    <a:pt x="6087686" y="5207700"/>
-                    <a:pt x="6174667" y="5143360"/>
-                    <a:pt x="6258766" y="5077603"/>
-                  </a:cubicBezTo>
-                  <a:close/>
-                  <a:moveTo>
-                    <a:pt x="4139342" y="440"/>
-                  </a:moveTo>
-                  <a:cubicBezTo>
-                    <a:pt x="4198237" y="1301"/>
-                    <a:pt x="4257068" y="3427"/>
-                    <a:pt x="4315744" y="6808"/>
-                  </a:cubicBezTo>
-                  <a:cubicBezTo>
-                    <a:pt x="4550841" y="20849"/>
-                    <a:pt x="4785806" y="55240"/>
-                    <a:pt x="5015400" y="113591"/>
-                  </a:cubicBezTo>
-                  <a:cubicBezTo>
-                    <a:pt x="5244992" y="171812"/>
-                    <a:pt x="5469212" y="254249"/>
-                    <a:pt x="5681114" y="361418"/>
-                  </a:cubicBezTo>
-                  <a:cubicBezTo>
-                    <a:pt x="5892754" y="468586"/>
-                    <a:pt x="6093124" y="599584"/>
-                    <a:pt x="6270952" y="755441"/>
-                  </a:cubicBezTo>
-                  <a:lnTo>
-                    <a:pt x="6326724" y="807432"/>
-                  </a:lnTo>
-                  <a:lnTo>
-                    <a:pt x="6326724" y="1231565"/>
-                  </a:lnTo>
-                  <a:lnTo>
-                    <a:pt x="6302093" y="1203002"/>
-                  </a:lnTo>
-                  <a:cubicBezTo>
-                    <a:pt x="6227937" y="1127247"/>
-                    <a:pt x="6149211" y="1056081"/>
-                    <a:pt x="6066914" y="989616"/>
-                  </a:cubicBezTo>
-                  <a:cubicBezTo>
-                    <a:pt x="5902714" y="856299"/>
-                    <a:pt x="5724360" y="740371"/>
-                    <a:pt x="5533688" y="647242"/>
-                  </a:cubicBezTo>
-                  <a:cubicBezTo>
-                    <a:pt x="5343146" y="553857"/>
-                    <a:pt x="5141466" y="482239"/>
-                    <a:pt x="4933626" y="432262"/>
-                  </a:cubicBezTo>
-                  <a:cubicBezTo>
-                    <a:pt x="4725788" y="382156"/>
-                    <a:pt x="4512182" y="353303"/>
-                    <a:pt x="4296873" y="343126"/>
-                  </a:cubicBezTo>
-                  <a:cubicBezTo>
-                    <a:pt x="4081172" y="332435"/>
-                    <a:pt x="3865732" y="339520"/>
-                    <a:pt x="3651602" y="365797"/>
-                  </a:cubicBezTo>
-                  <a:cubicBezTo>
-                    <a:pt x="3437604" y="392202"/>
-                    <a:pt x="3225572" y="436384"/>
-                    <a:pt x="3018256" y="496666"/>
-                  </a:cubicBezTo>
-                  <a:cubicBezTo>
-                    <a:pt x="2810809" y="556691"/>
-                    <a:pt x="2608474" y="634362"/>
-                    <a:pt x="2412429" y="724399"/>
-                  </a:cubicBezTo>
-                  <a:cubicBezTo>
-                    <a:pt x="2019160" y="902541"/>
-                    <a:pt x="1651969" y="1138775"/>
-                    <a:pt x="1329857" y="1424086"/>
-                  </a:cubicBezTo>
-                  <a:cubicBezTo>
-                    <a:pt x="1169326" y="1567192"/>
-                    <a:pt x="1020588" y="1723307"/>
-                    <a:pt x="887314" y="1891015"/>
-                  </a:cubicBezTo>
-                  <a:cubicBezTo>
-                    <a:pt x="753778" y="2058466"/>
-                    <a:pt x="635967" y="2238026"/>
-                    <a:pt x="537420" y="2427245"/>
-                  </a:cubicBezTo>
-                  <a:cubicBezTo>
-                    <a:pt x="438874" y="2616335"/>
-                    <a:pt x="356839" y="2814313"/>
-                    <a:pt x="299965" y="3020021"/>
-                  </a:cubicBezTo>
-                  <a:cubicBezTo>
-                    <a:pt x="242961" y="3225212"/>
-                    <a:pt x="213474" y="3438518"/>
-                    <a:pt x="213606" y="3651953"/>
-                  </a:cubicBezTo>
-                  <a:cubicBezTo>
-                    <a:pt x="214785" y="3756804"/>
-                    <a:pt x="225269" y="3860881"/>
-                    <a:pt x="250036" y="3961352"/>
-                  </a:cubicBezTo>
-                  <a:cubicBezTo>
-                    <a:pt x="274412" y="4061950"/>
-                    <a:pt x="312284" y="4158171"/>
-                    <a:pt x="357625" y="4250783"/>
-                  </a:cubicBezTo>
-                  <a:cubicBezTo>
-                    <a:pt x="380558" y="4297025"/>
-                    <a:pt x="405982" y="4342366"/>
-                    <a:pt x="432715" y="4387063"/>
-                  </a:cubicBezTo>
-                  <a:cubicBezTo>
-                    <a:pt x="459841" y="4431630"/>
-                    <a:pt x="488803" y="4475554"/>
-                    <a:pt x="518943" y="4518962"/>
-                  </a:cubicBezTo>
-                  <a:cubicBezTo>
-                    <a:pt x="580011" y="4605521"/>
-                    <a:pt x="647893" y="4689504"/>
-                    <a:pt x="718133" y="4773874"/>
-                  </a:cubicBezTo>
-                  <a:cubicBezTo>
-                    <a:pt x="788374" y="4858372"/>
-                    <a:pt x="861760" y="4942871"/>
-                    <a:pt x="933704" y="5030717"/>
-                  </a:cubicBezTo>
-                  <a:cubicBezTo>
-                    <a:pt x="969742" y="5074512"/>
-                    <a:pt x="1005387" y="5119337"/>
-                    <a:pt x="1040900" y="5164806"/>
-                  </a:cubicBezTo>
-                  <a:lnTo>
-                    <a:pt x="1092401" y="5230628"/>
-                  </a:lnTo>
-                  <a:cubicBezTo>
-                    <a:pt x="1109306" y="5251624"/>
-                    <a:pt x="1125425" y="5273135"/>
-                    <a:pt x="1142854" y="5293615"/>
-                  </a:cubicBezTo>
-                  <a:cubicBezTo>
-                    <a:pt x="1278880" y="5460293"/>
-                    <a:pt x="1426438" y="5613704"/>
-                    <a:pt x="1576354" y="5759128"/>
-                  </a:cubicBezTo>
-                  <a:cubicBezTo>
-                    <a:pt x="1651706" y="5831519"/>
-                    <a:pt x="1728368" y="5901461"/>
-                    <a:pt x="1806865" y="5968571"/>
-                  </a:cubicBezTo>
-                  <a:cubicBezTo>
-                    <a:pt x="1885362" y="6035680"/>
-                    <a:pt x="1965299" y="6100599"/>
-                    <a:pt x="2048253" y="6161654"/>
-                  </a:cubicBezTo>
-                  <a:cubicBezTo>
-                    <a:pt x="2213502" y="6284022"/>
-                    <a:pt x="2391724" y="6393380"/>
-                    <a:pt x="2587506" y="6467059"/>
-                  </a:cubicBezTo>
-                  <a:cubicBezTo>
-                    <a:pt x="2685137" y="6503898"/>
-                    <a:pt x="2786304" y="6532106"/>
-                    <a:pt x="2889176" y="6553360"/>
-                  </a:cubicBezTo>
-                  <a:lnTo>
-                    <a:pt x="2929698" y="6561326"/>
-                  </a:lnTo>
-                  <a:lnTo>
-                    <a:pt x="1816374" y="6561326"/>
-                  </a:lnTo>
-                  <a:lnTo>
-                    <a:pt x="1787601" y="6545761"/>
-                  </a:lnTo>
-                  <a:cubicBezTo>
-                    <a:pt x="1577272" y="6422749"/>
-                    <a:pt x="1389483" y="6266761"/>
-                    <a:pt x="1225544" y="6094158"/>
-                  </a:cubicBezTo>
-                  <a:cubicBezTo>
-                    <a:pt x="1143116" y="6007986"/>
-                    <a:pt x="1068158" y="5916274"/>
-                    <a:pt x="997654" y="5822374"/>
-                  </a:cubicBezTo>
-                  <a:cubicBezTo>
-                    <a:pt x="927546" y="5728086"/>
-                    <a:pt x="860842" y="5632381"/>
-                    <a:pt x="798596" y="5534615"/>
-                  </a:cubicBezTo>
-                  <a:cubicBezTo>
-                    <a:pt x="782608" y="5510399"/>
-                    <a:pt x="767537" y="5485797"/>
-                    <a:pt x="752075" y="5461324"/>
-                  </a:cubicBezTo>
-                  <a:lnTo>
-                    <a:pt x="707650" y="5390221"/>
-                  </a:lnTo>
-                  <a:cubicBezTo>
-                    <a:pt x="679213" y="5344237"/>
-                    <a:pt x="649728" y="5298638"/>
-                    <a:pt x="619980" y="5252396"/>
-                  </a:cubicBezTo>
-                  <a:lnTo>
-                    <a:pt x="438349" y="4970822"/>
-                  </a:lnTo>
-                  <a:cubicBezTo>
-                    <a:pt x="377413" y="4874860"/>
-                    <a:pt x="317263" y="4776064"/>
-                    <a:pt x="261044" y="4673145"/>
-                  </a:cubicBezTo>
-                  <a:cubicBezTo>
-                    <a:pt x="233000" y="4621622"/>
-                    <a:pt x="205874" y="4569197"/>
-                    <a:pt x="181107" y="4515356"/>
-                  </a:cubicBezTo>
-                  <a:cubicBezTo>
-                    <a:pt x="156470" y="4461385"/>
-                    <a:pt x="133537" y="4406385"/>
-                    <a:pt x="113224" y="4350223"/>
-                  </a:cubicBezTo>
-                  <a:cubicBezTo>
-                    <a:pt x="93305" y="4293934"/>
-                    <a:pt x="75614" y="4236872"/>
-                    <a:pt x="61199" y="4178908"/>
-                  </a:cubicBezTo>
-                  <a:cubicBezTo>
-                    <a:pt x="54385" y="4149927"/>
-                    <a:pt x="47440" y="4120815"/>
-                    <a:pt x="41804" y="4091577"/>
-                  </a:cubicBezTo>
-                  <a:lnTo>
-                    <a:pt x="33287" y="4047781"/>
-                  </a:lnTo>
-                  <a:lnTo>
-                    <a:pt x="26209" y="4003858"/>
-                  </a:lnTo>
-                  <a:cubicBezTo>
-                    <a:pt x="7732" y="3886643"/>
-                    <a:pt x="0" y="3768783"/>
-                    <a:pt x="0" y="3651953"/>
-                  </a:cubicBezTo>
-                  <a:cubicBezTo>
-                    <a:pt x="524" y="3422031"/>
-                    <a:pt x="25030" y="3192109"/>
-                    <a:pt x="72731" y="2966307"/>
-                  </a:cubicBezTo>
-                  <a:cubicBezTo>
-                    <a:pt x="120301" y="2740634"/>
-                    <a:pt x="193163" y="2519343"/>
-                    <a:pt x="291316" y="2309385"/>
-                  </a:cubicBezTo>
-                  <a:cubicBezTo>
-                    <a:pt x="488540" y="1889469"/>
-                    <a:pt x="774352" y="1513736"/>
-                    <a:pt x="1110878" y="1193776"/>
-                  </a:cubicBezTo>
-                  <a:cubicBezTo>
-                    <a:pt x="1279535" y="1033797"/>
-                    <a:pt x="1461821" y="887856"/>
-                    <a:pt x="1654327" y="756730"/>
-                  </a:cubicBezTo>
-                  <a:cubicBezTo>
-                    <a:pt x="1847096" y="625732"/>
-                    <a:pt x="2049956" y="509031"/>
-                    <a:pt x="2261727" y="409720"/>
-                  </a:cubicBezTo>
-                  <a:cubicBezTo>
-                    <a:pt x="2685792" y="212515"/>
-                    <a:pt x="3142357" y="82162"/>
-                    <a:pt x="3610060" y="27032"/>
-                  </a:cubicBezTo>
-                  <a:cubicBezTo>
-                    <a:pt x="3785399" y="6647"/>
-                    <a:pt x="3962657" y="-2144"/>
-                    <a:pt x="4139342" y="440"/>
-                  </a:cubicBezTo>
-                  <a:close/>
-                </a:path>
-              </a:pathLst>
-            </a:custGeom>
-            <a:gradFill>
-              <a:gsLst>
-                <a:gs pos="2000">
-                  <a:schemeClr val="bg1">
-                    <a:alpha val="10000"/>
-                  </a:schemeClr>
-                </a:gs>
-                <a:gs pos="16000">
-                  <a:schemeClr val="accent6">
-                    <a:alpha val="10000"/>
-                  </a:schemeClr>
-                </a:gs>
-                <a:gs pos="100000">
-                  <a:schemeClr val="bg1">
-                    <a:alpha val="10000"/>
-                  </a:schemeClr>
-                </a:gs>
-                <a:gs pos="85000">
-                  <a:schemeClr val="accent1">
-                    <a:alpha val="10000"/>
-                  </a:schemeClr>
-                </a:gs>
-              </a:gsLst>
-              <a:lin ang="12000000" scaled="0"/>
-            </a:gradFill>
-            <a:ln>
-              <a:noFill/>
-            </a:ln>
-          </p:spPr>
-          <p:style>
-            <a:lnRef idx="2">
-              <a:schemeClr val="accent1">
-                <a:shade val="50000"/>
-              </a:schemeClr>
-            </a:lnRef>
-            <a:fillRef idx="1">
-              <a:schemeClr val="accent1"/>
-            </a:fillRef>
-            <a:effectRef idx="0">
-              <a:schemeClr val="accent1"/>
-            </a:effectRef>
-            <a:fontRef idx="minor">
-              <a:schemeClr val="lt1"/>
-            </a:fontRef>
-          </p:style>
-          <p:txBody>
-            <a:bodyPr rtlCol="0" anchor="ctr"/>
-            <a:lstStyle/>
-            <a:p>
-              <a:pPr algn="ctr"/>
-              <a:endParaRPr lang="en-US"/>
-            </a:p>
-          </p:txBody>
-        </p:sp>
-        <p:sp>
-          <p:nvSpPr>
-            <p:cNvPr id="39" name="Freeform: Shape 38">
-              <a:extLst>
-                <a:ext uri="{FF2B5EF4-FFF2-40B4-BE49-F238E27FC236}">
-                  <a16:creationId xmlns:a16="http://schemas.microsoft.com/office/drawing/2014/main" id="{BC4A6C98-F96E-4587-B01F-A9B01BBFAD01}"/>
-                </a:ext>
-                <a:ext uri="{C183D7F6-B498-43B3-948B-1728B52AA6E4}">
-                  <adec:decorative xmlns:adec="http://schemas.microsoft.com/office/drawing/2017/decorative" val="1"/>
-                </a:ext>
-              </a:extLst>
-            </p:cNvPr>
-            <p:cNvSpPr/>
-            <p:nvPr>
-              <p:extLst>
-                <p:ext uri="{386F3935-93C4-4BCD-93E2-E3B085C9AB24}">
-                  <p16:designElem xmlns:p16="http://schemas.microsoft.com/office/powerpoint/2015/main" val="1"/>
-                </p:ext>
-              </p:extLst>
-            </p:nvPr>
-          </p:nvSpPr>
-          <p:spPr>
-            <a:xfrm>
-              <a:off x="5870322" y="353119"/>
-              <a:ext cx="6321679" cy="6521594"/>
-            </a:xfrm>
-            <a:custGeom>
-              <a:avLst/>
-              <a:gdLst>
-                <a:gd name="connsiteX0" fmla="*/ 4150102 w 6321679"/>
-                <a:gd name="connsiteY0" fmla="*/ 0 h 6521594"/>
-                <a:gd name="connsiteX1" fmla="*/ 6083891 w 6321679"/>
-                <a:gd name="connsiteY1" fmla="*/ 619943 h 6521594"/>
-                <a:gd name="connsiteX2" fmla="*/ 6321679 w 6321679"/>
-                <a:gd name="connsiteY2" fmla="*/ 822247 h 6521594"/>
-                <a:gd name="connsiteX3" fmla="*/ 6321679 w 6321679"/>
-                <a:gd name="connsiteY3" fmla="*/ 1866928 h 6521594"/>
-                <a:gd name="connsiteX4" fmla="*/ 6212358 w 6321679"/>
-                <a:gd name="connsiteY4" fmla="*/ 1689281 h 6521594"/>
-                <a:gd name="connsiteX5" fmla="*/ 6049880 w 6321679"/>
-                <a:gd name="connsiteY5" fmla="*/ 1477173 h 6521594"/>
-                <a:gd name="connsiteX6" fmla="*/ 5248663 w 6321679"/>
-                <a:gd name="connsiteY6" fmla="*/ 869327 h 6521594"/>
-                <a:gd name="connsiteX7" fmla="*/ 4150102 w 6321679"/>
-                <a:gd name="connsiteY7" fmla="*/ 644042 h 6521594"/>
-                <a:gd name="connsiteX8" fmla="*/ 2867946 w 6321679"/>
-                <a:gd name="connsiteY8" fmla="*/ 886459 h 6521594"/>
-                <a:gd name="connsiteX9" fmla="*/ 1728892 w 6321679"/>
-                <a:gd name="connsiteY9" fmla="*/ 1552397 h 6521594"/>
-                <a:gd name="connsiteX10" fmla="*/ 941043 w 6321679"/>
-                <a:gd name="connsiteY10" fmla="*/ 2512664 h 6521594"/>
-                <a:gd name="connsiteX11" fmla="*/ 655362 w 6321679"/>
-                <a:gd name="connsiteY11" fmla="*/ 3630204 h 6521594"/>
-                <a:gd name="connsiteX12" fmla="*/ 1128177 w 6321679"/>
-                <a:gd name="connsiteY12" fmla="*/ 4667883 h 6521594"/>
-                <a:gd name="connsiteX13" fmla="*/ 1366419 w 6321679"/>
-                <a:gd name="connsiteY13" fmla="*/ 4997246 h 6521594"/>
-                <a:gd name="connsiteX14" fmla="*/ 3601937 w 6321679"/>
-                <a:gd name="connsiteY14" fmla="*/ 6284685 h 6521594"/>
-                <a:gd name="connsiteX15" fmla="*/ 5298985 w 6321679"/>
-                <a:gd name="connsiteY15" fmla="*/ 5492643 h 6521594"/>
-                <a:gd name="connsiteX16" fmla="*/ 5505513 w 6321679"/>
-                <a:gd name="connsiteY16" fmla="*/ 5335367 h 6521594"/>
-                <a:gd name="connsiteX17" fmla="*/ 6252618 w 6321679"/>
-                <a:gd name="connsiteY17" fmla="*/ 4722492 h 6521594"/>
-                <a:gd name="connsiteX18" fmla="*/ 6321679 w 6321679"/>
-                <a:gd name="connsiteY18" fmla="*/ 4651477 h 6521594"/>
-                <a:gd name="connsiteX19" fmla="*/ 6321679 w 6321679"/>
-                <a:gd name="connsiteY19" fmla="*/ 5523097 h 6521594"/>
-                <a:gd name="connsiteX20" fmla="*/ 6024428 w 6321679"/>
-                <a:gd name="connsiteY20" fmla="*/ 5754969 h 6521594"/>
-                <a:gd name="connsiteX21" fmla="*/ 5702345 w 6321679"/>
-                <a:gd name="connsiteY21" fmla="*/ 6000018 h 6521594"/>
-                <a:gd name="connsiteX22" fmla="*/ 4988380 w 6321679"/>
-                <a:gd name="connsiteY22" fmla="*/ 6506549 h 6521594"/>
-                <a:gd name="connsiteX23" fmla="*/ 4961490 w 6321679"/>
-                <a:gd name="connsiteY23" fmla="*/ 6521594 h 6521594"/>
-                <a:gd name="connsiteX24" fmla="*/ 2011326 w 6321679"/>
-                <a:gd name="connsiteY24" fmla="*/ 6521594 h 6521594"/>
-                <a:gd name="connsiteX25" fmla="*/ 1982893 w 6321679"/>
-                <a:gd name="connsiteY25" fmla="*/ 6505768 h 6521594"/>
-                <a:gd name="connsiteX26" fmla="*/ 824149 w 6321679"/>
-                <a:gd name="connsiteY26" fmla="*/ 5358682 h 6521594"/>
-                <a:gd name="connsiteX27" fmla="*/ 0 w 6321679"/>
-                <a:gd name="connsiteY27" fmla="*/ 3630075 h 6521594"/>
-                <a:gd name="connsiteX28" fmla="*/ 4150102 w 6321679"/>
-                <a:gd name="connsiteY28" fmla="*/ 0 h 6521594"/>
-              </a:gdLst>
-              <a:ahLst/>
-              <a:cxnLst>
-                <a:cxn ang="0">
-                  <a:pos x="connsiteX0" y="connsiteY0"/>
-                </a:cxn>
-                <a:cxn ang="0">
-                  <a:pos x="connsiteX1" y="connsiteY1"/>
-                </a:cxn>
-                <a:cxn ang="0">
-                  <a:pos x="connsiteX2" y="connsiteY2"/>
-                </a:cxn>
-                <a:cxn ang="0">
-                  <a:pos x="connsiteX3" y="connsiteY3"/>
-                </a:cxn>
-                <a:cxn ang="0">
-                  <a:pos x="connsiteX4" y="connsiteY4"/>
-                </a:cxn>
-                <a:cxn ang="0">
-                  <a:pos x="connsiteX5" y="connsiteY5"/>
-                </a:cxn>
-                <a:cxn ang="0">
-                  <a:pos x="connsiteX6" y="connsiteY6"/>
-                </a:cxn>
-                <a:cxn ang="0">
-                  <a:pos x="connsiteX7" y="connsiteY7"/>
-                </a:cxn>
-                <a:cxn ang="0">
-                  <a:pos x="connsiteX8" y="connsiteY8"/>
-                </a:cxn>
-                <a:cxn ang="0">
-                  <a:pos x="connsiteX9" y="connsiteY9"/>
-                </a:cxn>
-                <a:cxn ang="0">
-                  <a:pos x="connsiteX10" y="connsiteY10"/>
-                </a:cxn>
-                <a:cxn ang="0">
-                  <a:pos x="connsiteX11" y="connsiteY11"/>
-                </a:cxn>
-                <a:cxn ang="0">
-                  <a:pos x="connsiteX12" y="connsiteY12"/>
-                </a:cxn>
-                <a:cxn ang="0">
-                  <a:pos x="connsiteX13" y="connsiteY13"/>
-                </a:cxn>
-                <a:cxn ang="0">
-                  <a:pos x="connsiteX14" y="connsiteY14"/>
-                </a:cxn>
-                <a:cxn ang="0">
-                  <a:pos x="connsiteX15" y="connsiteY15"/>
-                </a:cxn>
-                <a:cxn ang="0">
-                  <a:pos x="connsiteX16" y="connsiteY16"/>
-                </a:cxn>
-                <a:cxn ang="0">
-                  <a:pos x="connsiteX17" y="connsiteY17"/>
-                </a:cxn>
-                <a:cxn ang="0">
-                  <a:pos x="connsiteX18" y="connsiteY18"/>
-                </a:cxn>
-                <a:cxn ang="0">
-                  <a:pos x="connsiteX19" y="connsiteY19"/>
-                </a:cxn>
-                <a:cxn ang="0">
-                  <a:pos x="connsiteX20" y="connsiteY20"/>
-                </a:cxn>
-                <a:cxn ang="0">
-                  <a:pos x="connsiteX21" y="connsiteY21"/>
-                </a:cxn>
-                <a:cxn ang="0">
-                  <a:pos x="connsiteX22" y="connsiteY22"/>
-                </a:cxn>
-                <a:cxn ang="0">
-                  <a:pos x="connsiteX23" y="connsiteY23"/>
-                </a:cxn>
-                <a:cxn ang="0">
-                  <a:pos x="connsiteX24" y="connsiteY24"/>
-                </a:cxn>
-                <a:cxn ang="0">
-                  <a:pos x="connsiteX25" y="connsiteY25"/>
-                </a:cxn>
-                <a:cxn ang="0">
-                  <a:pos x="connsiteX26" y="connsiteY26"/>
-                </a:cxn>
-                <a:cxn ang="0">
-                  <a:pos x="connsiteX27" y="connsiteY27"/>
-                </a:cxn>
-                <a:cxn ang="0">
-                  <a:pos x="connsiteX28" y="connsiteY28"/>
-                </a:cxn>
-              </a:cxnLst>
-              <a:rect l="l" t="t" r="r" b="b"/>
-              <a:pathLst>
-                <a:path w="6321679" h="6521594">
-                  <a:moveTo>
-                    <a:pt x="4150102" y="0"/>
-                  </a:moveTo>
-                  <a:cubicBezTo>
-                    <a:pt x="4918148" y="0"/>
-                    <a:pt x="5569597" y="228540"/>
-                    <a:pt x="6083891" y="619943"/>
-                  </a:cubicBezTo>
-                  <a:lnTo>
-                    <a:pt x="6321679" y="822247"/>
-                  </a:lnTo>
-                  <a:lnTo>
-                    <a:pt x="6321679" y="1866928"/>
-                  </a:lnTo>
-                  <a:lnTo>
-                    <a:pt x="6212358" y="1689281"/>
-                  </a:lnTo>
-                  <a:cubicBezTo>
-                    <a:pt x="6161484" y="1615222"/>
-                    <a:pt x="6107295" y="1544427"/>
-                    <a:pt x="6049880" y="1477173"/>
-                  </a:cubicBezTo>
-                  <a:cubicBezTo>
-                    <a:pt x="5825135" y="1214018"/>
-                    <a:pt x="5555573" y="1009470"/>
-                    <a:pt x="5248663" y="869327"/>
-                  </a:cubicBezTo>
-                  <a:cubicBezTo>
-                    <a:pt x="4921178" y="719909"/>
-                    <a:pt x="4551627" y="644042"/>
-                    <a:pt x="4150102" y="644042"/>
-                  </a:cubicBezTo>
-                  <a:cubicBezTo>
-                    <a:pt x="3724203" y="644042"/>
-                    <a:pt x="3292799" y="725448"/>
-                    <a:pt x="2867946" y="886459"/>
-                  </a:cubicBezTo>
-                  <a:cubicBezTo>
-                    <a:pt x="2454234" y="1042832"/>
-                    <a:pt x="2060440" y="1273141"/>
-                    <a:pt x="1728892" y="1552397"/>
-                  </a:cubicBezTo>
-                  <a:cubicBezTo>
-                    <a:pt x="1391580" y="1836419"/>
-                    <a:pt x="1126473" y="2159600"/>
-                    <a:pt x="941043" y="2512664"/>
-                  </a:cubicBezTo>
-                  <a:cubicBezTo>
-                    <a:pt x="751551" y="2873583"/>
-                    <a:pt x="655362" y="3249575"/>
-                    <a:pt x="655362" y="3630204"/>
-                  </a:cubicBezTo>
-                  <a:cubicBezTo>
-                    <a:pt x="655362" y="4013537"/>
-                    <a:pt x="808817" y="4237405"/>
-                    <a:pt x="1128177" y="4667883"/>
-                  </a:cubicBezTo>
-                  <a:cubicBezTo>
-                    <a:pt x="1205232" y="4771702"/>
-                    <a:pt x="1284908" y="4879129"/>
-                    <a:pt x="1366419" y="4997246"/>
-                  </a:cubicBezTo>
-                  <a:cubicBezTo>
-                    <a:pt x="1989282" y="5899677"/>
-                    <a:pt x="2657880" y="6284685"/>
-                    <a:pt x="3601937" y="6284685"/>
-                  </a:cubicBezTo>
-                  <a:cubicBezTo>
-                    <a:pt x="4221523" y="6284685"/>
-                    <a:pt x="4676122" y="5971036"/>
-                    <a:pt x="5298985" y="5492643"/>
-                  </a:cubicBezTo>
-                  <a:cubicBezTo>
-                    <a:pt x="5368571" y="5439187"/>
-                    <a:pt x="5438156" y="5386375"/>
-                    <a:pt x="5505513" y="5335367"/>
-                  </a:cubicBezTo>
-                  <a:cubicBezTo>
-                    <a:pt x="5779335" y="5127761"/>
-                    <a:pt x="6041730" y="4928776"/>
-                    <a:pt x="6252618" y="4722492"/>
-                  </a:cubicBezTo>
-                  <a:lnTo>
-                    <a:pt x="6321679" y="4651477"/>
-                  </a:lnTo>
-                  <a:lnTo>
-                    <a:pt x="6321679" y="5523097"/>
-                  </a:lnTo>
-                  <a:lnTo>
-                    <a:pt x="6024428" y="5754969"/>
-                  </a:lnTo>
-                  <a:cubicBezTo>
-                    <a:pt x="5918395" y="5835747"/>
-                    <a:pt x="5810491" y="5916953"/>
-                    <a:pt x="5702345" y="6000018"/>
-                  </a:cubicBezTo>
-                  <a:cubicBezTo>
-                    <a:pt x="5466020" y="6181541"/>
-                    <a:pt x="5232938" y="6357503"/>
-                    <a:pt x="4988380" y="6506549"/>
-                  </a:cubicBezTo>
-                  <a:lnTo>
-                    <a:pt x="4961490" y="6521594"/>
-                  </a:lnTo>
-                  <a:lnTo>
-                    <a:pt x="2011326" y="6521594"/>
-                  </a:lnTo>
-                  <a:lnTo>
-                    <a:pt x="1982893" y="6505768"/>
-                  </a:lnTo>
-                  <a:cubicBezTo>
-                    <a:pt x="1531799" y="6233999"/>
-                    <a:pt x="1157400" y="5841520"/>
-                    <a:pt x="824149" y="5358682"/>
-                  </a:cubicBezTo>
-                  <a:cubicBezTo>
-                    <a:pt x="424196" y="4779302"/>
-                    <a:pt x="0" y="4381929"/>
-                    <a:pt x="0" y="3630075"/>
-                  </a:cubicBezTo>
-                  <a:cubicBezTo>
-                    <a:pt x="0" y="1625174"/>
-                    <a:pt x="2089794" y="0"/>
-                    <a:pt x="4150102" y="0"/>
-                  </a:cubicBezTo>
-                  <a:close/>
-                </a:path>
-              </a:pathLst>
-            </a:custGeom>
-            <a:gradFill>
-              <a:gsLst>
-                <a:gs pos="2000">
-                  <a:schemeClr val="bg1">
-                    <a:alpha val="10000"/>
-                  </a:schemeClr>
-                </a:gs>
-                <a:gs pos="16000">
-                  <a:schemeClr val="accent6">
-                    <a:alpha val="10000"/>
-                  </a:schemeClr>
-                </a:gs>
-                <a:gs pos="100000">
-                  <a:schemeClr val="bg1">
-                    <a:alpha val="10000"/>
-                  </a:schemeClr>
-                </a:gs>
-                <a:gs pos="85000">
-                  <a:schemeClr val="accent1">
-                    <a:alpha val="10000"/>
-                  </a:schemeClr>
-                </a:gs>
-              </a:gsLst>
-              <a:lin ang="12000000" scaled="0"/>
-            </a:gradFill>
-            <a:ln>
-              <a:noFill/>
-            </a:ln>
-          </p:spPr>
-          <p:style>
-            <a:lnRef idx="2">
-              <a:schemeClr val="accent1">
-                <a:shade val="50000"/>
-              </a:schemeClr>
-            </a:lnRef>
-            <a:fillRef idx="1">
-              <a:schemeClr val="accent1"/>
-            </a:fillRef>
-            <a:effectRef idx="0">
-              <a:schemeClr val="accent1"/>
-            </a:effectRef>
-            <a:fontRef idx="minor">
-              <a:schemeClr val="lt1"/>
-            </a:fontRef>
-          </p:style>
-          <p:txBody>
-            <a:bodyPr rtlCol="0" anchor="ctr"/>
-            <a:lstStyle/>
-            <a:p>
-              <a:pPr algn="ctr"/>
-              <a:endParaRPr lang="en-US"/>
-            </a:p>
-          </p:txBody>
-        </p:sp>
-        <p:sp>
-          <p:nvSpPr>
-            <p:cNvPr id="40" name="Freeform: Shape 39">
-              <a:extLst>
-                <a:ext uri="{FF2B5EF4-FFF2-40B4-BE49-F238E27FC236}">
-                  <a16:creationId xmlns:a16="http://schemas.microsoft.com/office/drawing/2014/main" id="{A66409EC-9CC3-482A-A4A5-54ED092B3F22}"/>
-                </a:ext>
-                <a:ext uri="{C183D7F6-B498-43B3-948B-1728B52AA6E4}">
-                  <adec:decorative xmlns:adec="http://schemas.microsoft.com/office/drawing/2017/decorative" val="1"/>
-                </a:ext>
-              </a:extLst>
-            </p:cNvPr>
-            <p:cNvSpPr/>
-            <p:nvPr>
-              <p:extLst>
-                <p:ext uri="{386F3935-93C4-4BCD-93E2-E3B085C9AB24}">
-                  <p16:designElem xmlns:p16="http://schemas.microsoft.com/office/powerpoint/2015/main" val="1"/>
-                </p:ext>
-              </p:extLst>
-            </p:nvPr>
-          </p:nvSpPr>
-          <p:spPr>
-            <a:xfrm>
-              <a:off x="5870322" y="353119"/>
-              <a:ext cx="6321679" cy="6521594"/>
-            </a:xfrm>
-            <a:custGeom>
-              <a:avLst/>
-              <a:gdLst>
-                <a:gd name="connsiteX0" fmla="*/ 4150102 w 6321679"/>
-                <a:gd name="connsiteY0" fmla="*/ 0 h 6521594"/>
-                <a:gd name="connsiteX1" fmla="*/ 6083891 w 6321679"/>
-                <a:gd name="connsiteY1" fmla="*/ 619943 h 6521594"/>
-                <a:gd name="connsiteX2" fmla="*/ 6321679 w 6321679"/>
-                <a:gd name="connsiteY2" fmla="*/ 822247 h 6521594"/>
-                <a:gd name="connsiteX3" fmla="*/ 6321679 w 6321679"/>
-                <a:gd name="connsiteY3" fmla="*/ 2150195 h 6521594"/>
-                <a:gd name="connsiteX4" fmla="*/ 6241288 w 6321679"/>
-                <a:gd name="connsiteY4" fmla="*/ 1985338 h 6521594"/>
-                <a:gd name="connsiteX5" fmla="*/ 5949367 w 6321679"/>
-                <a:gd name="connsiteY5" fmla="*/ 1559997 h 6521594"/>
-                <a:gd name="connsiteX6" fmla="*/ 5193362 w 6321679"/>
-                <a:gd name="connsiteY6" fmla="*/ 986156 h 6521594"/>
-                <a:gd name="connsiteX7" fmla="*/ 4150102 w 6321679"/>
-                <a:gd name="connsiteY7" fmla="*/ 772850 h 6521594"/>
-                <a:gd name="connsiteX8" fmla="*/ 2914861 w 6321679"/>
-                <a:gd name="connsiteY8" fmla="*/ 1006637 h 6521594"/>
-                <a:gd name="connsiteX9" fmla="*/ 1814073 w 6321679"/>
-                <a:gd name="connsiteY9" fmla="*/ 1650163 h 6521594"/>
-                <a:gd name="connsiteX10" fmla="*/ 1057412 w 6321679"/>
-                <a:gd name="connsiteY10" fmla="*/ 2571657 h 6521594"/>
-                <a:gd name="connsiteX11" fmla="*/ 786277 w 6321679"/>
-                <a:gd name="connsiteY11" fmla="*/ 3630204 h 6521594"/>
-                <a:gd name="connsiteX12" fmla="*/ 1233931 w 6321679"/>
-                <a:gd name="connsiteY12" fmla="*/ 4592016 h 6521594"/>
-                <a:gd name="connsiteX13" fmla="*/ 1474795 w 6321679"/>
-                <a:gd name="connsiteY13" fmla="*/ 4924985 h 6521594"/>
-                <a:gd name="connsiteX14" fmla="*/ 2393691 w 6321679"/>
-                <a:gd name="connsiteY14" fmla="*/ 5846995 h 6521594"/>
-                <a:gd name="connsiteX15" fmla="*/ 3601805 w 6321679"/>
-                <a:gd name="connsiteY15" fmla="*/ 6155876 h 6521594"/>
-                <a:gd name="connsiteX16" fmla="*/ 4378909 w 6321679"/>
-                <a:gd name="connsiteY16" fmla="*/ 5959186 h 6521594"/>
-                <a:gd name="connsiteX17" fmla="*/ 5218129 w 6321679"/>
-                <a:gd name="connsiteY17" fmla="*/ 5391271 h 6521594"/>
-                <a:gd name="connsiteX18" fmla="*/ 5425313 w 6321679"/>
-                <a:gd name="connsiteY18" fmla="*/ 5233481 h 6521594"/>
-                <a:gd name="connsiteX19" fmla="*/ 6254366 w 6321679"/>
-                <a:gd name="connsiteY19" fmla="*/ 4534301 h 6521594"/>
-                <a:gd name="connsiteX20" fmla="*/ 6321679 w 6321679"/>
-                <a:gd name="connsiteY20" fmla="*/ 4456641 h 6521594"/>
-                <a:gd name="connsiteX21" fmla="*/ 6321679 w 6321679"/>
-                <a:gd name="connsiteY21" fmla="*/ 5523097 h 6521594"/>
-                <a:gd name="connsiteX22" fmla="*/ 6024428 w 6321679"/>
-                <a:gd name="connsiteY22" fmla="*/ 5754969 h 6521594"/>
-                <a:gd name="connsiteX23" fmla="*/ 5702345 w 6321679"/>
-                <a:gd name="connsiteY23" fmla="*/ 6000018 h 6521594"/>
-                <a:gd name="connsiteX24" fmla="*/ 4988380 w 6321679"/>
-                <a:gd name="connsiteY24" fmla="*/ 6506549 h 6521594"/>
-                <a:gd name="connsiteX25" fmla="*/ 4961490 w 6321679"/>
-                <a:gd name="connsiteY25" fmla="*/ 6521594 h 6521594"/>
-                <a:gd name="connsiteX26" fmla="*/ 2011326 w 6321679"/>
-                <a:gd name="connsiteY26" fmla="*/ 6521594 h 6521594"/>
-                <a:gd name="connsiteX27" fmla="*/ 1982893 w 6321679"/>
-                <a:gd name="connsiteY27" fmla="*/ 6505768 h 6521594"/>
-                <a:gd name="connsiteX28" fmla="*/ 824149 w 6321679"/>
-                <a:gd name="connsiteY28" fmla="*/ 5358682 h 6521594"/>
-                <a:gd name="connsiteX29" fmla="*/ 0 w 6321679"/>
-                <a:gd name="connsiteY29" fmla="*/ 3630075 h 6521594"/>
-                <a:gd name="connsiteX30" fmla="*/ 4150102 w 6321679"/>
-                <a:gd name="connsiteY30" fmla="*/ 0 h 6521594"/>
-              </a:gdLst>
-              <a:ahLst/>
-              <a:cxnLst>
-                <a:cxn ang="0">
-                  <a:pos x="connsiteX0" y="connsiteY0"/>
-                </a:cxn>
-                <a:cxn ang="0">
-                  <a:pos x="connsiteX1" y="connsiteY1"/>
-                </a:cxn>
-                <a:cxn ang="0">
-                  <a:pos x="connsiteX2" y="connsiteY2"/>
-                </a:cxn>
-                <a:cxn ang="0">
-                  <a:pos x="connsiteX3" y="connsiteY3"/>
-                </a:cxn>
-                <a:cxn ang="0">
-                  <a:pos x="connsiteX4" y="connsiteY4"/>
-                </a:cxn>
-                <a:cxn ang="0">
-                  <a:pos x="connsiteX5" y="connsiteY5"/>
-                </a:cxn>
-                <a:cxn ang="0">
-                  <a:pos x="connsiteX6" y="connsiteY6"/>
-                </a:cxn>
-                <a:cxn ang="0">
-                  <a:pos x="connsiteX7" y="connsiteY7"/>
-                </a:cxn>
-                <a:cxn ang="0">
-                  <a:pos x="connsiteX8" y="connsiteY8"/>
-                </a:cxn>
-                <a:cxn ang="0">
-                  <a:pos x="connsiteX9" y="connsiteY9"/>
-                </a:cxn>
-                <a:cxn ang="0">
-                  <a:pos x="connsiteX10" y="connsiteY10"/>
-                </a:cxn>
-                <a:cxn ang="0">
-                  <a:pos x="connsiteX11" y="connsiteY11"/>
-                </a:cxn>
-                <a:cxn ang="0">
-                  <a:pos x="connsiteX12" y="connsiteY12"/>
-                </a:cxn>
-                <a:cxn ang="0">
-                  <a:pos x="connsiteX13" y="connsiteY13"/>
-                </a:cxn>
-                <a:cxn ang="0">
-                  <a:pos x="connsiteX14" y="connsiteY14"/>
-                </a:cxn>
-                <a:cxn ang="0">
-                  <a:pos x="connsiteX15" y="connsiteY15"/>
-                </a:cxn>
-                <a:cxn ang="0">
-                  <a:pos x="connsiteX16" y="connsiteY16"/>
-                </a:cxn>
-                <a:cxn ang="0">
-                  <a:pos x="connsiteX17" y="connsiteY17"/>
-                </a:cxn>
-                <a:cxn ang="0">
-                  <a:pos x="connsiteX18" y="connsiteY18"/>
-                </a:cxn>
-                <a:cxn ang="0">
-                  <a:pos x="connsiteX19" y="connsiteY19"/>
-                </a:cxn>
-                <a:cxn ang="0">
-                  <a:pos x="connsiteX20" y="connsiteY20"/>
-                </a:cxn>
-                <a:cxn ang="0">
-                  <a:pos x="connsiteX21" y="connsiteY21"/>
-                </a:cxn>
-                <a:cxn ang="0">
-                  <a:pos x="connsiteX22" y="connsiteY22"/>
-                </a:cxn>
-                <a:cxn ang="0">
-                  <a:pos x="connsiteX23" y="connsiteY23"/>
-                </a:cxn>
-                <a:cxn ang="0">
-                  <a:pos x="connsiteX24" y="connsiteY24"/>
-                </a:cxn>
-                <a:cxn ang="0">
-                  <a:pos x="connsiteX25" y="connsiteY25"/>
-                </a:cxn>
-                <a:cxn ang="0">
-                  <a:pos x="connsiteX26" y="connsiteY26"/>
-                </a:cxn>
-                <a:cxn ang="0">
-                  <a:pos x="connsiteX27" y="connsiteY27"/>
-                </a:cxn>
-                <a:cxn ang="0">
-                  <a:pos x="connsiteX28" y="connsiteY28"/>
-                </a:cxn>
-                <a:cxn ang="0">
-                  <a:pos x="connsiteX29" y="connsiteY29"/>
-                </a:cxn>
-                <a:cxn ang="0">
-                  <a:pos x="connsiteX30" y="connsiteY30"/>
-                </a:cxn>
-              </a:cxnLst>
-              <a:rect l="l" t="t" r="r" b="b"/>
-              <a:pathLst>
-                <a:path w="6321679" h="6521594">
-                  <a:moveTo>
-                    <a:pt x="4150102" y="0"/>
-                  </a:moveTo>
-                  <a:cubicBezTo>
-                    <a:pt x="4918148" y="0"/>
-                    <a:pt x="5569597" y="228540"/>
-                    <a:pt x="6083891" y="619943"/>
-                  </a:cubicBezTo>
-                  <a:lnTo>
-                    <a:pt x="6321679" y="822247"/>
-                  </a:lnTo>
-                  <a:lnTo>
-                    <a:pt x="6321679" y="2150195"/>
-                  </a:lnTo>
-                  <a:lnTo>
-                    <a:pt x="6241288" y="1985338"/>
-                  </a:lnTo>
-                  <a:cubicBezTo>
-                    <a:pt x="6156788" y="1831195"/>
-                    <a:pt x="6059249" y="1688709"/>
-                    <a:pt x="5949367" y="1559997"/>
-                  </a:cubicBezTo>
-                  <a:cubicBezTo>
-                    <a:pt x="5737073" y="1311397"/>
-                    <a:pt x="5482843" y="1118314"/>
-                    <a:pt x="5193362" y="986156"/>
-                  </a:cubicBezTo>
-                  <a:cubicBezTo>
-                    <a:pt x="4883437" y="844596"/>
-                    <a:pt x="4532365" y="772850"/>
-                    <a:pt x="4150102" y="772850"/>
-                  </a:cubicBezTo>
-                  <a:cubicBezTo>
-                    <a:pt x="3746218" y="772850"/>
-                    <a:pt x="3319008" y="853613"/>
-                    <a:pt x="2914861" y="1006637"/>
-                  </a:cubicBezTo>
-                  <a:cubicBezTo>
-                    <a:pt x="2515039" y="1157857"/>
-                    <a:pt x="2134350" y="1380438"/>
-                    <a:pt x="1814073" y="1650163"/>
-                  </a:cubicBezTo>
-                  <a:cubicBezTo>
-                    <a:pt x="1494190" y="1919502"/>
-                    <a:pt x="1232622" y="2238173"/>
-                    <a:pt x="1057412" y="2571657"/>
-                  </a:cubicBezTo>
-                  <a:cubicBezTo>
-                    <a:pt x="877486" y="2914158"/>
-                    <a:pt x="786277" y="3270313"/>
-                    <a:pt x="786277" y="3630204"/>
-                  </a:cubicBezTo>
-                  <a:cubicBezTo>
-                    <a:pt x="786277" y="3974121"/>
-                    <a:pt x="923483" y="4173646"/>
-                    <a:pt x="1233931" y="4592016"/>
-                  </a:cubicBezTo>
-                  <a:cubicBezTo>
-                    <a:pt x="1311641" y="4696736"/>
-                    <a:pt x="1391972" y="4805064"/>
-                    <a:pt x="1474795" y="4924985"/>
-                  </a:cubicBezTo>
-                  <a:cubicBezTo>
-                    <a:pt x="1767682" y="5349278"/>
-                    <a:pt x="2068172" y="5650948"/>
-                    <a:pt x="2393691" y="5846995"/>
-                  </a:cubicBezTo>
-                  <a:cubicBezTo>
-                    <a:pt x="2738735" y="6054891"/>
-                    <a:pt x="3133971" y="6155876"/>
-                    <a:pt x="3601805" y="6155876"/>
-                  </a:cubicBezTo>
-                  <a:cubicBezTo>
-                    <a:pt x="3867305" y="6155876"/>
-                    <a:pt x="4114196" y="6093405"/>
-                    <a:pt x="4378909" y="5959186"/>
-                  </a:cubicBezTo>
-                  <a:cubicBezTo>
-                    <a:pt x="4650699" y="5821362"/>
-                    <a:pt x="4919737" y="5620421"/>
-                    <a:pt x="5218129" y="5391271"/>
-                  </a:cubicBezTo>
-                  <a:cubicBezTo>
-                    <a:pt x="5288107" y="5337558"/>
-                    <a:pt x="5357824" y="5284617"/>
-                    <a:pt x="5425313" y="5233481"/>
-                  </a:cubicBezTo>
-                  <a:cubicBezTo>
-                    <a:pt x="5739037" y="4995556"/>
-                    <a:pt x="6037512" y="4769168"/>
-                    <a:pt x="6254366" y="4534301"/>
-                  </a:cubicBezTo>
-                  <a:lnTo>
-                    <a:pt x="6321679" y="4456641"/>
-                  </a:lnTo>
-                  <a:lnTo>
-                    <a:pt x="6321679" y="5523097"/>
-                  </a:lnTo>
-                  <a:lnTo>
-                    <a:pt x="6024428" y="5754969"/>
-                  </a:lnTo>
-                  <a:cubicBezTo>
-                    <a:pt x="5918395" y="5835747"/>
-                    <a:pt x="5810491" y="5916953"/>
-                    <a:pt x="5702345" y="6000018"/>
-                  </a:cubicBezTo>
-                  <a:cubicBezTo>
-                    <a:pt x="5466020" y="6181541"/>
-                    <a:pt x="5232938" y="6357503"/>
-                    <a:pt x="4988380" y="6506549"/>
-                  </a:cubicBezTo>
-                  <a:lnTo>
-                    <a:pt x="4961490" y="6521594"/>
-                  </a:lnTo>
-                  <a:lnTo>
-                    <a:pt x="2011326" y="6521594"/>
-                  </a:lnTo>
-                  <a:lnTo>
-                    <a:pt x="1982893" y="6505768"/>
-                  </a:lnTo>
-                  <a:cubicBezTo>
-                    <a:pt x="1531799" y="6233999"/>
-                    <a:pt x="1157400" y="5841520"/>
-                    <a:pt x="824149" y="5358682"/>
-                  </a:cubicBezTo>
-                  <a:cubicBezTo>
-                    <a:pt x="424196" y="4779302"/>
-                    <a:pt x="0" y="4381929"/>
-                    <a:pt x="0" y="3630075"/>
-                  </a:cubicBezTo>
-                  <a:cubicBezTo>
-                    <a:pt x="0" y="1625174"/>
-                    <a:pt x="2089794" y="0"/>
-                    <a:pt x="4150102" y="0"/>
-                  </a:cubicBezTo>
-                  <a:close/>
-                </a:path>
-              </a:pathLst>
-            </a:custGeom>
-            <a:gradFill>
-              <a:gsLst>
-                <a:gs pos="2000">
-                  <a:schemeClr val="bg1">
-                    <a:alpha val="10000"/>
-                  </a:schemeClr>
-                </a:gs>
-                <a:gs pos="16000">
-                  <a:schemeClr val="accent6">
-                    <a:alpha val="10000"/>
-                  </a:schemeClr>
-                </a:gs>
-                <a:gs pos="100000">
-                  <a:schemeClr val="bg1">
-                    <a:alpha val="10000"/>
-                  </a:schemeClr>
-                </a:gs>
-                <a:gs pos="85000">
-                  <a:schemeClr val="accent1">
-                    <a:alpha val="10000"/>
-                  </a:schemeClr>
-                </a:gs>
-              </a:gsLst>
-              <a:lin ang="12000000" scaled="0"/>
-            </a:gradFill>
-            <a:ln>
-              <a:noFill/>
-            </a:ln>
-          </p:spPr>
-          <p:style>
-            <a:lnRef idx="2">
-              <a:schemeClr val="accent1">
-                <a:shade val="50000"/>
-              </a:schemeClr>
-            </a:lnRef>
-            <a:fillRef idx="1">
-              <a:schemeClr val="accent1"/>
-            </a:fillRef>
-            <a:effectRef idx="0">
-              <a:schemeClr val="accent1"/>
-            </a:effectRef>
-            <a:fontRef idx="minor">
-              <a:schemeClr val="lt1"/>
-            </a:fontRef>
-          </p:style>
-          <p:txBody>
-            <a:bodyPr rtlCol="0" anchor="ctr"/>
-            <a:lstStyle/>
-            <a:p>
-              <a:pPr algn="ctr"/>
-              <a:endParaRPr lang="en-US"/>
-            </a:p>
-          </p:txBody>
-        </p:sp>
-      </p:grpSp>
+            <a:endParaRPr lang="en-GB" sz="1900"/>
+          </a:p>
+        </p:txBody>
+      </p:sp>
     </p:spTree>
     <p:extLst>
       <p:ext uri="{BB962C8B-B14F-4D97-AF65-F5344CB8AC3E}">

</xml_diff>